<commit_message>
ajout des animations de thierry pour les métaclasses
</commit_message>
<xml_diff>
--- a/w9/w9-s4-av-slide1.pptx
+++ b/w9/w9-s4-av-slide1.pptx
@@ -5,10 +5,10 @@
     <p:sldMasterId id="2147483649" r:id="rId1"/>
   </p:sldMasterIdLst>
   <p:notesMasterIdLst>
-    <p:notesMasterId r:id="rId26"/>
+    <p:notesMasterId r:id="rId29"/>
   </p:notesMasterIdLst>
   <p:handoutMasterIdLst>
-    <p:handoutMasterId r:id="rId27"/>
+    <p:handoutMasterId r:id="rId30"/>
   </p:handoutMasterIdLst>
   <p:sldIdLst>
     <p:sldId id="256" r:id="rId2"/>
@@ -26,15 +26,18 @@
     <p:sldId id="276" r:id="rId14"/>
     <p:sldId id="272" r:id="rId15"/>
     <p:sldId id="271" r:id="rId16"/>
-    <p:sldId id="278" r:id="rId17"/>
-    <p:sldId id="280" r:id="rId18"/>
-    <p:sldId id="289" r:id="rId19"/>
-    <p:sldId id="282" r:id="rId20"/>
-    <p:sldId id="283" r:id="rId21"/>
-    <p:sldId id="285" r:id="rId22"/>
-    <p:sldId id="286" r:id="rId23"/>
-    <p:sldId id="290" r:id="rId24"/>
-    <p:sldId id="291" r:id="rId25"/>
+    <p:sldId id="292" r:id="rId17"/>
+    <p:sldId id="278" r:id="rId18"/>
+    <p:sldId id="280" r:id="rId19"/>
+    <p:sldId id="289" r:id="rId20"/>
+    <p:sldId id="282" r:id="rId21"/>
+    <p:sldId id="283" r:id="rId22"/>
+    <p:sldId id="285" r:id="rId23"/>
+    <p:sldId id="286" r:id="rId24"/>
+    <p:sldId id="290" r:id="rId25"/>
+    <p:sldId id="291" r:id="rId26"/>
+    <p:sldId id="293" r:id="rId27"/>
+    <p:sldId id="294" r:id="rId28"/>
   </p:sldIdLst>
   <p:sldSz cx="12192000" cy="6858000"/>
   <p:notesSz cx="7099300" cy="10234613"/>
@@ -183,6 +186,7 @@
             <p14:sldId id="276"/>
             <p14:sldId id="272"/>
             <p14:sldId id="271"/>
+            <p14:sldId id="292"/>
             <p14:sldId id="278"/>
             <p14:sldId id="280"/>
             <p14:sldId id="289"/>
@@ -192,6 +196,8 @@
             <p14:sldId id="286"/>
             <p14:sldId id="290"/>
             <p14:sldId id="291"/>
+            <p14:sldId id="293"/>
+            <p14:sldId id="294"/>
           </p14:sldIdLst>
         </p14:section>
       </p14:sectionLst>
@@ -2110,7 +2116,7 @@
               <a:pPr>
                 <a:defRPr/>
               </a:pPr>
-              <a:t>16</a:t>
+              <a:t>17</a:t>
             </a:fld>
             <a:endParaRPr lang="en-US"/>
           </a:p>
@@ -2210,7 +2216,7 @@
               <a:pPr>
                 <a:defRPr/>
               </a:pPr>
-              <a:t>17</a:t>
+              <a:t>18</a:t>
             </a:fld>
             <a:endParaRPr lang="en-US"/>
           </a:p>
@@ -2310,7 +2316,7 @@
               <a:pPr>
                 <a:defRPr/>
               </a:pPr>
-              <a:t>18</a:t>
+              <a:t>19</a:t>
             </a:fld>
             <a:endParaRPr lang="en-US"/>
           </a:p>
@@ -2410,7 +2416,7 @@
               <a:pPr>
                 <a:defRPr/>
               </a:pPr>
-              <a:t>19</a:t>
+              <a:t>20</a:t>
             </a:fld>
             <a:endParaRPr lang="en-US"/>
           </a:p>
@@ -2518,7 +2524,7 @@
               <a:pPr>
                 <a:defRPr/>
               </a:pPr>
-              <a:t>20</a:t>
+              <a:t>21</a:t>
             </a:fld>
             <a:endParaRPr lang="en-US"/>
           </a:p>
@@ -2649,7 +2655,7 @@
               <a:pPr>
                 <a:defRPr/>
               </a:pPr>
-              <a:t>21</a:t>
+              <a:t>22</a:t>
             </a:fld>
             <a:endParaRPr lang="en-US"/>
           </a:p>
@@ -2916,7 +2922,7 @@
               <a:pPr>
                 <a:defRPr/>
               </a:pPr>
-              <a:t>22</a:t>
+              <a:t>23</a:t>
             </a:fld>
             <a:endParaRPr lang="en-US"/>
           </a:p>
@@ -3168,7 +3174,7 @@
               <a:pPr>
                 <a:defRPr/>
               </a:pPr>
-              <a:t>23</a:t>
+              <a:t>24</a:t>
             </a:fld>
             <a:endParaRPr lang="en-US"/>
           </a:p>
@@ -3310,7 +3316,7 @@
               <a:pPr>
                 <a:defRPr/>
               </a:pPr>
-              <a:t>24</a:t>
+              <a:t>25</a:t>
             </a:fld>
             <a:endParaRPr lang="en-US"/>
           </a:p>
@@ -9699,6 +9705,1363 @@
       </p:grpSpPr>
       <p:sp>
         <p:nvSpPr>
+          <p:cNvPr id="7" name="ZoneTexte 6"/>
+          <p:cNvSpPr txBox="1"/>
+          <p:nvPr/>
+        </p:nvSpPr>
+        <p:spPr>
+          <a:xfrm>
+            <a:off x="4174065" y="4056554"/>
+            <a:ext cx="2031999" cy="769441"/>
+          </a:xfrm>
+          <a:prstGeom prst="rect">
+            <a:avLst/>
+          </a:prstGeom>
+          <a:noFill/>
+          <a:ln w="50800">
+            <a:solidFill>
+              <a:schemeClr val="tx1"/>
+            </a:solidFill>
+          </a:ln>
+        </p:spPr>
+        <p:txBody>
+          <a:bodyPr wrap="square" rtlCol="0">
+            <a:spAutoFit/>
+          </a:bodyPr>
+          <a:lstStyle/>
+          <a:p>
+            <a:pPr algn="ctr"/>
+            <a:r>
+              <a:rPr lang="fr-FR" sz="4400" dirty="0" smtClean="0">
+                <a:latin typeface="Calibri" panose="020F0502020204030204" pitchFamily="34" charset="0"/>
+                <a:cs typeface="Calibri" panose="020F0502020204030204" pitchFamily="34" charset="0"/>
+              </a:rPr>
+              <a:t>class C</a:t>
+            </a:r>
+            <a:endParaRPr lang="fr-FR" sz="4400" dirty="0">
+              <a:latin typeface="Calibri" panose="020F0502020204030204" pitchFamily="34" charset="0"/>
+              <a:cs typeface="Calibri" panose="020F0502020204030204" pitchFamily="34" charset="0"/>
+            </a:endParaRPr>
+          </a:p>
+        </p:txBody>
+      </p:sp>
+      <p:sp>
+        <p:nvSpPr>
+          <p:cNvPr id="9" name="ZoneTexte 8"/>
+          <p:cNvSpPr txBox="1"/>
+          <p:nvPr/>
+        </p:nvSpPr>
+        <p:spPr>
+          <a:xfrm>
+            <a:off x="4174065" y="2397088"/>
+            <a:ext cx="2031999" cy="769441"/>
+          </a:xfrm>
+          <a:prstGeom prst="rect">
+            <a:avLst/>
+          </a:prstGeom>
+          <a:noFill/>
+          <a:ln w="50800">
+            <a:solidFill>
+              <a:schemeClr val="tx1"/>
+            </a:solidFill>
+          </a:ln>
+        </p:spPr>
+        <p:txBody>
+          <a:bodyPr wrap="square" rtlCol="0">
+            <a:spAutoFit/>
+          </a:bodyPr>
+          <a:lstStyle/>
+          <a:p>
+            <a:pPr algn="ctr"/>
+            <a:r>
+              <a:rPr lang="fr-FR" sz="4400" dirty="0" smtClean="0">
+                <a:latin typeface="Calibri" panose="020F0502020204030204" pitchFamily="34" charset="0"/>
+                <a:cs typeface="Calibri" panose="020F0502020204030204" pitchFamily="34" charset="0"/>
+              </a:rPr>
+              <a:t>class B</a:t>
+            </a:r>
+            <a:endParaRPr lang="fr-FR" sz="4400" dirty="0">
+              <a:latin typeface="Calibri" panose="020F0502020204030204" pitchFamily="34" charset="0"/>
+              <a:cs typeface="Calibri" panose="020F0502020204030204" pitchFamily="34" charset="0"/>
+            </a:endParaRPr>
+          </a:p>
+        </p:txBody>
+      </p:sp>
+      <p:sp>
+        <p:nvSpPr>
+          <p:cNvPr id="10" name="ZoneTexte 9"/>
+          <p:cNvSpPr txBox="1"/>
+          <p:nvPr/>
+        </p:nvSpPr>
+        <p:spPr>
+          <a:xfrm>
+            <a:off x="4174066" y="737621"/>
+            <a:ext cx="2031999" cy="769441"/>
+          </a:xfrm>
+          <a:prstGeom prst="rect">
+            <a:avLst/>
+          </a:prstGeom>
+          <a:noFill/>
+          <a:ln w="50800">
+            <a:solidFill>
+              <a:schemeClr val="tx1"/>
+            </a:solidFill>
+          </a:ln>
+        </p:spPr>
+        <p:txBody>
+          <a:bodyPr wrap="square" rtlCol="0">
+            <a:spAutoFit/>
+          </a:bodyPr>
+          <a:lstStyle/>
+          <a:p>
+            <a:pPr algn="ctr"/>
+            <a:r>
+              <a:rPr lang="fr-FR" sz="4400" dirty="0" err="1" smtClean="0">
+                <a:latin typeface="Calibri" panose="020F0502020204030204" pitchFamily="34" charset="0"/>
+                <a:cs typeface="Calibri" panose="020F0502020204030204" pitchFamily="34" charset="0"/>
+              </a:rPr>
+              <a:t>object</a:t>
+            </a:r>
+            <a:endParaRPr lang="fr-FR" sz="4400" dirty="0">
+              <a:latin typeface="Calibri" panose="020F0502020204030204" pitchFamily="34" charset="0"/>
+              <a:cs typeface="Calibri" panose="020F0502020204030204" pitchFamily="34" charset="0"/>
+            </a:endParaRPr>
+          </a:p>
+        </p:txBody>
+      </p:sp>
+      <p:sp>
+        <p:nvSpPr>
+          <p:cNvPr id="11" name="ZoneTexte 10"/>
+          <p:cNvSpPr txBox="1"/>
+          <p:nvPr/>
+        </p:nvSpPr>
+        <p:spPr>
+          <a:xfrm>
+            <a:off x="3352796" y="5716020"/>
+            <a:ext cx="3674536" cy="769441"/>
+          </a:xfrm>
+          <a:prstGeom prst="rect">
+            <a:avLst/>
+          </a:prstGeom>
+          <a:noFill/>
+          <a:ln w="50800">
+            <a:solidFill>
+              <a:schemeClr val="tx1"/>
+            </a:solidFill>
+          </a:ln>
+        </p:spPr>
+        <p:txBody>
+          <a:bodyPr wrap="square" rtlCol="0">
+            <a:spAutoFit/>
+          </a:bodyPr>
+          <a:lstStyle/>
+          <a:p>
+            <a:pPr algn="ctr"/>
+            <a:r>
+              <a:rPr lang="fr-FR" sz="4400" dirty="0">
+                <a:latin typeface="Calibri" panose="020F0502020204030204" pitchFamily="34" charset="0"/>
+                <a:cs typeface="Calibri" panose="020F0502020204030204" pitchFamily="34" charset="0"/>
+              </a:rPr>
+              <a:t>i</a:t>
+            </a:r>
+            <a:r>
+              <a:rPr lang="fr-FR" sz="4400" dirty="0" smtClean="0">
+                <a:latin typeface="Calibri" panose="020F0502020204030204" pitchFamily="34" charset="0"/>
+                <a:cs typeface="Calibri" panose="020F0502020204030204" pitchFamily="34" charset="0"/>
+              </a:rPr>
+              <a:t>nstance de C</a:t>
+            </a:r>
+            <a:endParaRPr lang="fr-FR" sz="4400" dirty="0">
+              <a:latin typeface="Calibri" panose="020F0502020204030204" pitchFamily="34" charset="0"/>
+              <a:cs typeface="Calibri" panose="020F0502020204030204" pitchFamily="34" charset="0"/>
+            </a:endParaRPr>
+          </a:p>
+        </p:txBody>
+      </p:sp>
+      <p:sp>
+        <p:nvSpPr>
+          <p:cNvPr id="12" name="ZoneTexte 11"/>
+          <p:cNvSpPr txBox="1"/>
+          <p:nvPr/>
+        </p:nvSpPr>
+        <p:spPr>
+          <a:xfrm>
+            <a:off x="770463" y="730175"/>
+            <a:ext cx="2031999" cy="769441"/>
+          </a:xfrm>
+          <a:prstGeom prst="rect">
+            <a:avLst/>
+          </a:prstGeom>
+          <a:noFill/>
+          <a:ln w="50800">
+            <a:solidFill>
+              <a:schemeClr val="tx1"/>
+            </a:solidFill>
+          </a:ln>
+        </p:spPr>
+        <p:txBody>
+          <a:bodyPr wrap="square" rtlCol="0">
+            <a:spAutoFit/>
+          </a:bodyPr>
+          <a:lstStyle/>
+          <a:p>
+            <a:pPr algn="ctr"/>
+            <a:r>
+              <a:rPr lang="fr-FR" sz="4400" dirty="0" smtClean="0">
+                <a:latin typeface="Calibri" panose="020F0502020204030204" pitchFamily="34" charset="0"/>
+                <a:cs typeface="Calibri" panose="020F0502020204030204" pitchFamily="34" charset="0"/>
+              </a:rPr>
+              <a:t>type</a:t>
+            </a:r>
+            <a:endParaRPr lang="fr-FR" sz="4400" dirty="0">
+              <a:latin typeface="Calibri" panose="020F0502020204030204" pitchFamily="34" charset="0"/>
+              <a:cs typeface="Calibri" panose="020F0502020204030204" pitchFamily="34" charset="0"/>
+            </a:endParaRPr>
+          </a:p>
+        </p:txBody>
+      </p:sp>
+      <p:cxnSp>
+        <p:nvCxnSpPr>
+          <p:cNvPr id="14" name="Connecteur droit avec flèche 13"/>
+          <p:cNvCxnSpPr>
+            <a:stCxn id="11" idx="0"/>
+            <a:endCxn id="7" idx="2"/>
+          </p:cNvCxnSpPr>
+          <p:nvPr/>
+        </p:nvCxnSpPr>
+        <p:spPr bwMode="auto">
+          <a:xfrm flipV="1">
+            <a:off x="5190064" y="4825995"/>
+            <a:ext cx="1" cy="890025"/>
+          </a:xfrm>
+          <a:prstGeom prst="straightConnector1">
+            <a:avLst/>
+          </a:prstGeom>
+          <a:noFill/>
+          <a:ln w="38100" cap="flat" cmpd="sng" algn="ctr">
+            <a:solidFill>
+              <a:srgbClr val="00B050"/>
+            </a:solidFill>
+            <a:prstDash val="solid"/>
+            <a:round/>
+            <a:headEnd type="none" w="med" len="med"/>
+            <a:tailEnd type="triangle" w="lg" len="lg"/>
+          </a:ln>
+          <a:effectLst/>
+        </p:spPr>
+      </p:cxnSp>
+      <p:sp>
+        <p:nvSpPr>
+          <p:cNvPr id="15" name="Forme libre 14"/>
+          <p:cNvSpPr/>
+          <p:nvPr/>
+        </p:nvSpPr>
+        <p:spPr bwMode="auto">
+          <a:xfrm>
+            <a:off x="1028292" y="1501698"/>
+            <a:ext cx="3120376" cy="2917902"/>
+          </a:xfrm>
+          <a:custGeom>
+            <a:avLst/>
+            <a:gdLst>
+              <a:gd name="connsiteX0" fmla="*/ 2776539 w 2776539"/>
+              <a:gd name="connsiteY0" fmla="*/ 2895600 h 2895600"/>
+              <a:gd name="connsiteX1" fmla="*/ 202672 w 2776539"/>
+              <a:gd name="connsiteY1" fmla="*/ 2133600 h 2895600"/>
+              <a:gd name="connsiteX2" fmla="*/ 355072 w 2776539"/>
+              <a:gd name="connsiteY2" fmla="*/ 0 h 2895600"/>
+              <a:gd name="connsiteX0" fmla="*/ 3209577 w 3209577"/>
+              <a:gd name="connsiteY0" fmla="*/ 2884448 h 2884448"/>
+              <a:gd name="connsiteX1" fmla="*/ 635710 w 3209577"/>
+              <a:gd name="connsiteY1" fmla="*/ 2122448 h 2884448"/>
+              <a:gd name="connsiteX2" fmla="*/ 107886 w 3209577"/>
+              <a:gd name="connsiteY2" fmla="*/ 0 h 2884448"/>
+              <a:gd name="connsiteX0" fmla="*/ 3130433 w 3130433"/>
+              <a:gd name="connsiteY0" fmla="*/ 2884448 h 2884448"/>
+              <a:gd name="connsiteX1" fmla="*/ 556566 w 3130433"/>
+              <a:gd name="connsiteY1" fmla="*/ 2122448 h 2884448"/>
+              <a:gd name="connsiteX2" fmla="*/ 28742 w 3130433"/>
+              <a:gd name="connsiteY2" fmla="*/ 0 h 2884448"/>
+              <a:gd name="connsiteX0" fmla="*/ 3120376 w 3120376"/>
+              <a:gd name="connsiteY0" fmla="*/ 2917902 h 2917902"/>
+              <a:gd name="connsiteX1" fmla="*/ 546509 w 3120376"/>
+              <a:gd name="connsiteY1" fmla="*/ 2155902 h 2917902"/>
+              <a:gd name="connsiteX2" fmla="*/ 29837 w 3120376"/>
+              <a:gd name="connsiteY2" fmla="*/ 0 h 2917902"/>
+            </a:gdLst>
+            <a:ahLst/>
+            <a:cxnLst>
+              <a:cxn ang="0">
+                <a:pos x="connsiteX0" y="connsiteY0"/>
+              </a:cxn>
+              <a:cxn ang="0">
+                <a:pos x="connsiteX1" y="connsiteY1"/>
+              </a:cxn>
+              <a:cxn ang="0">
+                <a:pos x="connsiteX2" y="connsiteY2"/>
+              </a:cxn>
+            </a:cxnLst>
+            <a:rect l="l" t="t" r="r" b="b"/>
+            <a:pathLst>
+              <a:path w="3120376" h="2917902">
+                <a:moveTo>
+                  <a:pt x="3120376" y="2917902"/>
+                </a:moveTo>
+                <a:cubicBezTo>
+                  <a:pt x="2035231" y="2778202"/>
+                  <a:pt x="1061599" y="2642219"/>
+                  <a:pt x="546509" y="2155902"/>
+                </a:cubicBezTo>
+                <a:cubicBezTo>
+                  <a:pt x="31419" y="1669585"/>
+                  <a:pt x="-58582" y="814349"/>
+                  <a:pt x="29837" y="0"/>
+                </a:cubicBezTo>
+              </a:path>
+            </a:pathLst>
+          </a:custGeom>
+          <a:noFill/>
+          <a:ln w="38100" cap="flat" cmpd="sng" algn="ctr">
+            <a:solidFill>
+              <a:srgbClr val="00B050"/>
+            </a:solidFill>
+            <a:prstDash val="solid"/>
+            <a:round/>
+            <a:headEnd type="none" w="med" len="med"/>
+            <a:tailEnd type="triangle" w="lg" len="lg"/>
+          </a:ln>
+          <a:effectLst/>
+        </p:spPr>
+        <p:txBody>
+          <a:bodyPr rtlCol="0" anchor="ctr"/>
+          <a:lstStyle/>
+          <a:p>
+            <a:pPr algn="ctr"/>
+            <a:endParaRPr lang="fr-FR"/>
+          </a:p>
+        </p:txBody>
+      </p:sp>
+      <p:sp>
+        <p:nvSpPr>
+          <p:cNvPr id="17" name="Forme libre 16"/>
+          <p:cNvSpPr/>
+          <p:nvPr/>
+        </p:nvSpPr>
+        <p:spPr bwMode="auto">
+          <a:xfrm>
+            <a:off x="1523883" y="1516566"/>
+            <a:ext cx="2646673" cy="1260088"/>
+          </a:xfrm>
+          <a:custGeom>
+            <a:avLst/>
+            <a:gdLst>
+              <a:gd name="connsiteX0" fmla="*/ 2646673 w 2646673"/>
+              <a:gd name="connsiteY0" fmla="*/ 1260088 h 1260088"/>
+              <a:gd name="connsiteX1" fmla="*/ 394127 w 2646673"/>
+              <a:gd name="connsiteY1" fmla="*/ 869795 h 1260088"/>
+              <a:gd name="connsiteX2" fmla="*/ 14985 w 2646673"/>
+              <a:gd name="connsiteY2" fmla="*/ 0 h 1260088"/>
+            </a:gdLst>
+            <a:ahLst/>
+            <a:cxnLst>
+              <a:cxn ang="0">
+                <a:pos x="connsiteX0" y="connsiteY0"/>
+              </a:cxn>
+              <a:cxn ang="0">
+                <a:pos x="connsiteX1" y="connsiteY1"/>
+              </a:cxn>
+              <a:cxn ang="0">
+                <a:pos x="connsiteX2" y="connsiteY2"/>
+              </a:cxn>
+            </a:cxnLst>
+            <a:rect l="l" t="t" r="r" b="b"/>
+            <a:pathLst>
+              <a:path w="2646673" h="1260088">
+                <a:moveTo>
+                  <a:pt x="2646673" y="1260088"/>
+                </a:moveTo>
+                <a:cubicBezTo>
+                  <a:pt x="1739707" y="1169949"/>
+                  <a:pt x="832742" y="1079810"/>
+                  <a:pt x="394127" y="869795"/>
+                </a:cubicBezTo>
+                <a:cubicBezTo>
+                  <a:pt x="-44488" y="659780"/>
+                  <a:pt x="-14752" y="329890"/>
+                  <a:pt x="14985" y="0"/>
+                </a:cubicBezTo>
+              </a:path>
+            </a:pathLst>
+          </a:custGeom>
+          <a:noFill/>
+          <a:ln w="38100" cap="flat" cmpd="sng" algn="ctr">
+            <a:solidFill>
+              <a:srgbClr val="00B050"/>
+            </a:solidFill>
+            <a:prstDash val="solid"/>
+            <a:round/>
+            <a:headEnd type="none" w="med" len="med"/>
+            <a:tailEnd type="triangle" w="lg" len="lg"/>
+          </a:ln>
+          <a:effectLst/>
+        </p:spPr>
+        <p:txBody>
+          <a:bodyPr rtlCol="0" anchor="ctr"/>
+          <a:lstStyle/>
+          <a:p>
+            <a:pPr algn="ctr"/>
+            <a:endParaRPr lang="fr-FR"/>
+          </a:p>
+        </p:txBody>
+      </p:sp>
+      <p:cxnSp>
+        <p:nvCxnSpPr>
+          <p:cNvPr id="21" name="Connecteur droit avec flèche 20"/>
+          <p:cNvCxnSpPr/>
+          <p:nvPr/>
+        </p:nvCxnSpPr>
+        <p:spPr bwMode="auto">
+          <a:xfrm flipH="1" flipV="1">
+            <a:off x="2802462" y="1271013"/>
+            <a:ext cx="1371604" cy="7446"/>
+          </a:xfrm>
+          <a:prstGeom prst="straightConnector1">
+            <a:avLst/>
+          </a:prstGeom>
+          <a:noFill/>
+          <a:ln w="38100" cap="flat" cmpd="sng" algn="ctr">
+            <a:solidFill>
+              <a:srgbClr val="00B050"/>
+            </a:solidFill>
+            <a:prstDash val="solid"/>
+            <a:round/>
+            <a:headEnd type="none" w="med" len="med"/>
+            <a:tailEnd type="triangle" w="lg" len="lg"/>
+          </a:ln>
+          <a:effectLst/>
+        </p:spPr>
+      </p:cxnSp>
+      <p:sp>
+        <p:nvSpPr>
+          <p:cNvPr id="22" name="Forme libre 21"/>
+          <p:cNvSpPr/>
+          <p:nvPr/>
+        </p:nvSpPr>
+        <p:spPr bwMode="auto">
+          <a:xfrm>
+            <a:off x="215201" y="215106"/>
+            <a:ext cx="1838853" cy="866562"/>
+          </a:xfrm>
+          <a:custGeom>
+            <a:avLst/>
+            <a:gdLst>
+              <a:gd name="connsiteX0" fmla="*/ 565384 w 1838853"/>
+              <a:gd name="connsiteY0" fmla="*/ 866562 h 866562"/>
+              <a:gd name="connsiteX1" fmla="*/ 52428 w 1838853"/>
+              <a:gd name="connsiteY1" fmla="*/ 141733 h 866562"/>
+              <a:gd name="connsiteX2" fmla="*/ 1691658 w 1838853"/>
+              <a:gd name="connsiteY2" fmla="*/ 30221 h 866562"/>
+              <a:gd name="connsiteX3" fmla="*/ 1658204 w 1838853"/>
+              <a:gd name="connsiteY3" fmla="*/ 520874 h 866562"/>
+            </a:gdLst>
+            <a:ahLst/>
+            <a:cxnLst>
+              <a:cxn ang="0">
+                <a:pos x="connsiteX0" y="connsiteY0"/>
+              </a:cxn>
+              <a:cxn ang="0">
+                <a:pos x="connsiteX1" y="connsiteY1"/>
+              </a:cxn>
+              <a:cxn ang="0">
+                <a:pos x="connsiteX2" y="connsiteY2"/>
+              </a:cxn>
+              <a:cxn ang="0">
+                <a:pos x="connsiteX3" y="connsiteY3"/>
+              </a:cxn>
+            </a:cxnLst>
+            <a:rect l="l" t="t" r="r" b="b"/>
+            <a:pathLst>
+              <a:path w="1838853" h="866562">
+                <a:moveTo>
+                  <a:pt x="565384" y="866562"/>
+                </a:moveTo>
+                <a:cubicBezTo>
+                  <a:pt x="215050" y="573842"/>
+                  <a:pt x="-135284" y="281123"/>
+                  <a:pt x="52428" y="141733"/>
+                </a:cubicBezTo>
+                <a:cubicBezTo>
+                  <a:pt x="240140" y="2343"/>
+                  <a:pt x="1424029" y="-32969"/>
+                  <a:pt x="1691658" y="30221"/>
+                </a:cubicBezTo>
+                <a:cubicBezTo>
+                  <a:pt x="1959287" y="93411"/>
+                  <a:pt x="1808745" y="307142"/>
+                  <a:pt x="1658204" y="520874"/>
+                </a:cubicBezTo>
+              </a:path>
+            </a:pathLst>
+          </a:custGeom>
+          <a:noFill/>
+          <a:ln w="38100" cap="flat" cmpd="sng" algn="ctr">
+            <a:solidFill>
+              <a:srgbClr val="00B050"/>
+            </a:solidFill>
+            <a:prstDash val="solid"/>
+            <a:round/>
+            <a:headEnd type="none" w="med" len="med"/>
+            <a:tailEnd type="triangle" w="lg" len="lg"/>
+          </a:ln>
+          <a:effectLst/>
+        </p:spPr>
+        <p:txBody>
+          <a:bodyPr rtlCol="0" anchor="ctr"/>
+          <a:lstStyle/>
+          <a:p>
+            <a:pPr algn="ctr"/>
+            <a:endParaRPr lang="fr-FR"/>
+          </a:p>
+        </p:txBody>
+      </p:sp>
+      <p:cxnSp>
+        <p:nvCxnSpPr>
+          <p:cNvPr id="24" name="Connecteur droit avec flèche 23"/>
+          <p:cNvCxnSpPr>
+            <a:stCxn id="7" idx="0"/>
+            <a:endCxn id="9" idx="2"/>
+          </p:cNvCxnSpPr>
+          <p:nvPr/>
+        </p:nvCxnSpPr>
+        <p:spPr bwMode="auto">
+          <a:xfrm flipV="1">
+            <a:off x="5190065" y="3166529"/>
+            <a:ext cx="0" cy="890025"/>
+          </a:xfrm>
+          <a:prstGeom prst="straightConnector1">
+            <a:avLst/>
+          </a:prstGeom>
+          <a:noFill/>
+          <a:ln w="38100" cap="flat" cmpd="sng" algn="ctr">
+            <a:solidFill>
+              <a:srgbClr val="FF0000"/>
+            </a:solidFill>
+            <a:prstDash val="solid"/>
+            <a:round/>
+            <a:headEnd type="none" w="med" len="med"/>
+            <a:tailEnd type="triangle" w="lg" len="lg"/>
+          </a:ln>
+          <a:effectLst/>
+        </p:spPr>
+      </p:cxnSp>
+      <p:cxnSp>
+        <p:nvCxnSpPr>
+          <p:cNvPr id="26" name="Connecteur droit avec flèche 25"/>
+          <p:cNvCxnSpPr>
+            <a:stCxn id="9" idx="0"/>
+            <a:endCxn id="10" idx="2"/>
+          </p:cNvCxnSpPr>
+          <p:nvPr/>
+        </p:nvCxnSpPr>
+        <p:spPr bwMode="auto">
+          <a:xfrm flipV="1">
+            <a:off x="5190065" y="1507062"/>
+            <a:ext cx="1" cy="890026"/>
+          </a:xfrm>
+          <a:prstGeom prst="straightConnector1">
+            <a:avLst/>
+          </a:prstGeom>
+          <a:noFill/>
+          <a:ln w="38100" cap="flat" cmpd="sng" algn="ctr">
+            <a:solidFill>
+              <a:srgbClr val="FF0000"/>
+            </a:solidFill>
+            <a:prstDash val="solid"/>
+            <a:round/>
+            <a:headEnd type="none" w="med" len="med"/>
+            <a:tailEnd type="triangle" w="lg" len="lg"/>
+          </a:ln>
+          <a:effectLst/>
+        </p:spPr>
+      </p:cxnSp>
+      <p:cxnSp>
+        <p:nvCxnSpPr>
+          <p:cNvPr id="28" name="Connecteur droit avec flèche 27"/>
+          <p:cNvCxnSpPr/>
+          <p:nvPr/>
+        </p:nvCxnSpPr>
+        <p:spPr bwMode="auto">
+          <a:xfrm>
+            <a:off x="2802462" y="959005"/>
+            <a:ext cx="1368094" cy="11151"/>
+          </a:xfrm>
+          <a:prstGeom prst="straightConnector1">
+            <a:avLst/>
+          </a:prstGeom>
+          <a:noFill/>
+          <a:ln w="38100" cap="flat" cmpd="sng" algn="ctr">
+            <a:solidFill>
+              <a:srgbClr val="FF0000"/>
+            </a:solidFill>
+            <a:prstDash val="solid"/>
+            <a:round/>
+            <a:headEnd type="none" w="med" len="med"/>
+            <a:tailEnd type="triangle" w="lg" len="lg"/>
+          </a:ln>
+          <a:effectLst/>
+        </p:spPr>
+      </p:cxnSp>
+      <p:grpSp>
+        <p:nvGrpSpPr>
+          <p:cNvPr id="40" name="Groupe 39"/>
+          <p:cNvGrpSpPr/>
+          <p:nvPr/>
+        </p:nvGrpSpPr>
+        <p:grpSpPr>
+          <a:xfrm>
+            <a:off x="-5600" y="5111834"/>
+            <a:ext cx="2808062" cy="1540459"/>
+            <a:chOff x="-79356" y="4560281"/>
+            <a:chExt cx="2808062" cy="1540459"/>
+          </a:xfrm>
+        </p:grpSpPr>
+        <p:cxnSp>
+          <p:nvCxnSpPr>
+            <p:cNvPr id="30" name="Connecteur droit avec flèche 29"/>
+            <p:cNvCxnSpPr/>
+            <p:nvPr/>
+          </p:nvCxnSpPr>
+          <p:spPr bwMode="auto">
+            <a:xfrm>
+              <a:off x="301084" y="5097940"/>
+              <a:ext cx="2118732" cy="0"/>
+            </a:xfrm>
+            <a:prstGeom prst="straightConnector1">
+              <a:avLst/>
+            </a:prstGeom>
+            <a:noFill/>
+            <a:ln w="38100" cap="flat" cmpd="sng" algn="ctr">
+              <a:solidFill>
+                <a:srgbClr val="00B050"/>
+              </a:solidFill>
+              <a:prstDash val="solid"/>
+              <a:round/>
+              <a:headEnd type="none" w="med" len="med"/>
+              <a:tailEnd type="triangle" w="lg" len="lg"/>
+            </a:ln>
+            <a:effectLst/>
+          </p:spPr>
+        </p:cxnSp>
+        <p:sp>
+          <p:nvSpPr>
+            <p:cNvPr id="31" name="ZoneTexte 30"/>
+            <p:cNvSpPr txBox="1"/>
+            <p:nvPr/>
+          </p:nvSpPr>
+          <p:spPr>
+            <a:xfrm>
+              <a:off x="-50219" y="4560281"/>
+              <a:ext cx="2778925" cy="523220"/>
+            </a:xfrm>
+            <a:prstGeom prst="rect">
+              <a:avLst/>
+            </a:prstGeom>
+            <a:noFill/>
+            <a:ln w="50800">
+              <a:noFill/>
+            </a:ln>
+          </p:spPr>
+          <p:txBody>
+            <a:bodyPr wrap="square" rtlCol="0">
+              <a:spAutoFit/>
+            </a:bodyPr>
+            <a:lstStyle/>
+            <a:p>
+              <a:pPr algn="ctr"/>
+              <a:r>
+                <a:rPr lang="fr-FR" sz="2800" dirty="0">
+                  <a:latin typeface="Calibri" panose="020F0502020204030204" pitchFamily="34" charset="0"/>
+                  <a:cs typeface="Calibri" panose="020F0502020204030204" pitchFamily="34" charset="0"/>
+                </a:rPr>
+                <a:t>i</a:t>
+              </a:r>
+              <a:r>
+                <a:rPr lang="fr-FR" sz="2800" dirty="0" smtClean="0">
+                  <a:latin typeface="Calibri" panose="020F0502020204030204" pitchFamily="34" charset="0"/>
+                  <a:cs typeface="Calibri" panose="020F0502020204030204" pitchFamily="34" charset="0"/>
+                </a:rPr>
+                <a:t>nstancié par</a:t>
+              </a:r>
+            </a:p>
+          </p:txBody>
+        </p:sp>
+        <p:cxnSp>
+          <p:nvCxnSpPr>
+            <p:cNvPr id="37" name="Connecteur droit avec flèche 36"/>
+            <p:cNvCxnSpPr/>
+            <p:nvPr/>
+          </p:nvCxnSpPr>
+          <p:spPr bwMode="auto">
+            <a:xfrm>
+              <a:off x="301084" y="5874808"/>
+              <a:ext cx="2118732" cy="0"/>
+            </a:xfrm>
+            <a:prstGeom prst="straightConnector1">
+              <a:avLst/>
+            </a:prstGeom>
+            <a:noFill/>
+            <a:ln w="38100" cap="flat" cmpd="sng" algn="ctr">
+              <a:solidFill>
+                <a:srgbClr val="FF0000"/>
+              </a:solidFill>
+              <a:prstDash val="solid"/>
+              <a:round/>
+              <a:headEnd type="none" w="med" len="med"/>
+              <a:tailEnd type="triangle" w="lg" len="lg"/>
+            </a:ln>
+            <a:effectLst/>
+          </p:spPr>
+        </p:cxnSp>
+        <p:sp>
+          <p:nvSpPr>
+            <p:cNvPr id="38" name="ZoneTexte 37"/>
+            <p:cNvSpPr txBox="1"/>
+            <p:nvPr/>
+          </p:nvSpPr>
+          <p:spPr>
+            <a:xfrm>
+              <a:off x="-79356" y="5328538"/>
+              <a:ext cx="2778925" cy="523220"/>
+            </a:xfrm>
+            <a:prstGeom prst="rect">
+              <a:avLst/>
+            </a:prstGeom>
+            <a:noFill/>
+            <a:ln w="50800">
+              <a:noFill/>
+            </a:ln>
+          </p:spPr>
+          <p:txBody>
+            <a:bodyPr wrap="square" rtlCol="0">
+              <a:spAutoFit/>
+            </a:bodyPr>
+            <a:lstStyle/>
+            <a:p>
+              <a:pPr algn="ctr"/>
+              <a:r>
+                <a:rPr lang="fr-FR" sz="2800" dirty="0" smtClean="0">
+                  <a:latin typeface="Calibri" panose="020F0502020204030204" pitchFamily="34" charset="0"/>
+                  <a:cs typeface="Calibri" panose="020F0502020204030204" pitchFamily="34" charset="0"/>
+                </a:rPr>
+                <a:t>hérite de</a:t>
+              </a:r>
+            </a:p>
+          </p:txBody>
+        </p:sp>
+        <p:sp>
+          <p:nvSpPr>
+            <p:cNvPr id="39" name="Rectangle à coins arrondis 38"/>
+            <p:cNvSpPr/>
+            <p:nvPr/>
+          </p:nvSpPr>
+          <p:spPr bwMode="auto">
+            <a:xfrm>
+              <a:off x="89210" y="4574720"/>
+              <a:ext cx="2499270" cy="1526020"/>
+            </a:xfrm>
+            <a:prstGeom prst="roundRect">
+              <a:avLst/>
+            </a:prstGeom>
+            <a:noFill/>
+            <a:ln w="38100" cap="flat" cmpd="sng" algn="ctr">
+              <a:solidFill>
+                <a:schemeClr val="tx1"/>
+              </a:solidFill>
+              <a:prstDash val="solid"/>
+              <a:round/>
+              <a:headEnd type="none" w="med" len="med"/>
+              <a:tailEnd type="triangle" w="lg" len="lg"/>
+            </a:ln>
+            <a:effectLst/>
+          </p:spPr>
+          <p:txBody>
+            <a:bodyPr rot="0" spcFirstLastPara="0" vertOverflow="overflow" horzOverflow="overflow" vert="horz" wrap="square" lIns="91440" tIns="45720" rIns="91440" bIns="45720" numCol="1" spcCol="0" rtlCol="0" fromWordArt="0" anchor="ctr" anchorCtr="0" forceAA="0" compatLnSpc="1">
+              <a:prstTxWarp prst="textNoShape">
+                <a:avLst/>
+              </a:prstTxWarp>
+              <a:noAutofit/>
+            </a:bodyPr>
+            <a:lstStyle/>
+            <a:p>
+              <a:pPr algn="ctr"/>
+              <a:endParaRPr lang="fr-FR"/>
+            </a:p>
+          </p:txBody>
+        </p:sp>
+      </p:grpSp>
+    </p:spTree>
+    <p:extLst>
+      <p:ext uri="{BB962C8B-B14F-4D97-AF65-F5344CB8AC3E}">
+        <p14:creationId xmlns:p14="http://schemas.microsoft.com/office/powerpoint/2010/main" val="702389453"/>
+      </p:ext>
+    </p:extLst>
+  </p:cSld>
+  <p:clrMapOvr>
+    <a:masterClrMapping/>
+  </p:clrMapOvr>
+  <p:timing>
+    <p:tnLst>
+      <p:par>
+        <p:cTn id="1" dur="indefinite" restart="never" nodeType="tmRoot">
+          <p:childTnLst>
+            <p:seq concurrent="1" nextAc="seek">
+              <p:cTn id="2" dur="indefinite" nodeType="mainSeq">
+                <p:childTnLst>
+                  <p:par>
+                    <p:cTn id="3" fill="hold">
+                      <p:stCondLst>
+                        <p:cond delay="indefinite"/>
+                      </p:stCondLst>
+                      <p:childTnLst>
+                        <p:par>
+                          <p:cTn id="4" fill="hold">
+                            <p:stCondLst>
+                              <p:cond delay="0"/>
+                            </p:stCondLst>
+                            <p:childTnLst>
+                              <p:par>
+                                <p:cTn id="5" presetID="10" presetClass="entr" presetSubtype="0" fill="hold" nodeType="clickEffect">
+                                  <p:stCondLst>
+                                    <p:cond delay="0"/>
+                                  </p:stCondLst>
+                                  <p:childTnLst>
+                                    <p:set>
+                                      <p:cBhvr>
+                                        <p:cTn id="6" dur="1" fill="hold">
+                                          <p:stCondLst>
+                                            <p:cond delay="0"/>
+                                          </p:stCondLst>
+                                        </p:cTn>
+                                        <p:tgtEl>
+                                          <p:spTgt spid="28"/>
+                                        </p:tgtEl>
+                                        <p:attrNameLst>
+                                          <p:attrName>style.visibility</p:attrName>
+                                        </p:attrNameLst>
+                                      </p:cBhvr>
+                                      <p:to>
+                                        <p:strVal val="visible"/>
+                                      </p:to>
+                                    </p:set>
+                                    <p:animEffect transition="in" filter="fade">
+                                      <p:cBhvr>
+                                        <p:cTn id="7" dur="500"/>
+                                        <p:tgtEl>
+                                          <p:spTgt spid="28"/>
+                                        </p:tgtEl>
+                                      </p:cBhvr>
+                                    </p:animEffect>
+                                  </p:childTnLst>
+                                </p:cTn>
+                              </p:par>
+                            </p:childTnLst>
+                          </p:cTn>
+                        </p:par>
+                      </p:childTnLst>
+                    </p:cTn>
+                  </p:par>
+                  <p:par>
+                    <p:cTn id="8" fill="hold">
+                      <p:stCondLst>
+                        <p:cond delay="indefinite"/>
+                      </p:stCondLst>
+                      <p:childTnLst>
+                        <p:par>
+                          <p:cTn id="9" fill="hold">
+                            <p:stCondLst>
+                              <p:cond delay="0"/>
+                            </p:stCondLst>
+                            <p:childTnLst>
+                              <p:par>
+                                <p:cTn id="10" presetID="10" presetClass="entr" presetSubtype="0" fill="hold" nodeType="clickEffect">
+                                  <p:stCondLst>
+                                    <p:cond delay="0"/>
+                                  </p:stCondLst>
+                                  <p:childTnLst>
+                                    <p:set>
+                                      <p:cBhvr>
+                                        <p:cTn id="11" dur="1" fill="hold">
+                                          <p:stCondLst>
+                                            <p:cond delay="0"/>
+                                          </p:stCondLst>
+                                        </p:cTn>
+                                        <p:tgtEl>
+                                          <p:spTgt spid="21"/>
+                                        </p:tgtEl>
+                                        <p:attrNameLst>
+                                          <p:attrName>style.visibility</p:attrName>
+                                        </p:attrNameLst>
+                                      </p:cBhvr>
+                                      <p:to>
+                                        <p:strVal val="visible"/>
+                                      </p:to>
+                                    </p:set>
+                                    <p:animEffect transition="in" filter="fade">
+                                      <p:cBhvr>
+                                        <p:cTn id="12" dur="500"/>
+                                        <p:tgtEl>
+                                          <p:spTgt spid="21"/>
+                                        </p:tgtEl>
+                                      </p:cBhvr>
+                                    </p:animEffect>
+                                  </p:childTnLst>
+                                </p:cTn>
+                              </p:par>
+                            </p:childTnLst>
+                          </p:cTn>
+                        </p:par>
+                      </p:childTnLst>
+                    </p:cTn>
+                  </p:par>
+                  <p:par>
+                    <p:cTn id="13" fill="hold">
+                      <p:stCondLst>
+                        <p:cond delay="indefinite"/>
+                      </p:stCondLst>
+                      <p:childTnLst>
+                        <p:par>
+                          <p:cTn id="14" fill="hold">
+                            <p:stCondLst>
+                              <p:cond delay="0"/>
+                            </p:stCondLst>
+                            <p:childTnLst>
+                              <p:par>
+                                <p:cTn id="15" presetID="10" presetClass="entr" presetSubtype="0" fill="hold" grpId="0" nodeType="clickEffect">
+                                  <p:stCondLst>
+                                    <p:cond delay="0"/>
+                                  </p:stCondLst>
+                                  <p:childTnLst>
+                                    <p:set>
+                                      <p:cBhvr>
+                                        <p:cTn id="16" dur="1" fill="hold">
+                                          <p:stCondLst>
+                                            <p:cond delay="0"/>
+                                          </p:stCondLst>
+                                        </p:cTn>
+                                        <p:tgtEl>
+                                          <p:spTgt spid="22"/>
+                                        </p:tgtEl>
+                                        <p:attrNameLst>
+                                          <p:attrName>style.visibility</p:attrName>
+                                        </p:attrNameLst>
+                                      </p:cBhvr>
+                                      <p:to>
+                                        <p:strVal val="visible"/>
+                                      </p:to>
+                                    </p:set>
+                                    <p:animEffect transition="in" filter="fade">
+                                      <p:cBhvr>
+                                        <p:cTn id="17" dur="500"/>
+                                        <p:tgtEl>
+                                          <p:spTgt spid="22"/>
+                                        </p:tgtEl>
+                                      </p:cBhvr>
+                                    </p:animEffect>
+                                  </p:childTnLst>
+                                </p:cTn>
+                              </p:par>
+                            </p:childTnLst>
+                          </p:cTn>
+                        </p:par>
+                      </p:childTnLst>
+                    </p:cTn>
+                  </p:par>
+                  <p:par>
+                    <p:cTn id="18" fill="hold">
+                      <p:stCondLst>
+                        <p:cond delay="indefinite"/>
+                      </p:stCondLst>
+                      <p:childTnLst>
+                        <p:par>
+                          <p:cTn id="19" fill="hold">
+                            <p:stCondLst>
+                              <p:cond delay="0"/>
+                            </p:stCondLst>
+                            <p:childTnLst>
+                              <p:par>
+                                <p:cTn id="20" presetID="10" presetClass="entr" presetSubtype="0" fill="hold" grpId="0" nodeType="clickEffect">
+                                  <p:stCondLst>
+                                    <p:cond delay="0"/>
+                                  </p:stCondLst>
+                                  <p:childTnLst>
+                                    <p:set>
+                                      <p:cBhvr>
+                                        <p:cTn id="21" dur="1" fill="hold">
+                                          <p:stCondLst>
+                                            <p:cond delay="0"/>
+                                          </p:stCondLst>
+                                        </p:cTn>
+                                        <p:tgtEl>
+                                          <p:spTgt spid="9"/>
+                                        </p:tgtEl>
+                                        <p:attrNameLst>
+                                          <p:attrName>style.visibility</p:attrName>
+                                        </p:attrNameLst>
+                                      </p:cBhvr>
+                                      <p:to>
+                                        <p:strVal val="visible"/>
+                                      </p:to>
+                                    </p:set>
+                                    <p:animEffect transition="in" filter="fade">
+                                      <p:cBhvr>
+                                        <p:cTn id="22" dur="500"/>
+                                        <p:tgtEl>
+                                          <p:spTgt spid="9"/>
+                                        </p:tgtEl>
+                                      </p:cBhvr>
+                                    </p:animEffect>
+                                  </p:childTnLst>
+                                </p:cTn>
+                              </p:par>
+                              <p:par>
+                                <p:cTn id="23" presetID="10" presetClass="entr" presetSubtype="0" fill="hold" nodeType="withEffect">
+                                  <p:stCondLst>
+                                    <p:cond delay="0"/>
+                                  </p:stCondLst>
+                                  <p:childTnLst>
+                                    <p:set>
+                                      <p:cBhvr>
+                                        <p:cTn id="24" dur="1" fill="hold">
+                                          <p:stCondLst>
+                                            <p:cond delay="0"/>
+                                          </p:stCondLst>
+                                        </p:cTn>
+                                        <p:tgtEl>
+                                          <p:spTgt spid="26"/>
+                                        </p:tgtEl>
+                                        <p:attrNameLst>
+                                          <p:attrName>style.visibility</p:attrName>
+                                        </p:attrNameLst>
+                                      </p:cBhvr>
+                                      <p:to>
+                                        <p:strVal val="visible"/>
+                                      </p:to>
+                                    </p:set>
+                                    <p:animEffect transition="in" filter="fade">
+                                      <p:cBhvr>
+                                        <p:cTn id="25" dur="500"/>
+                                        <p:tgtEl>
+                                          <p:spTgt spid="26"/>
+                                        </p:tgtEl>
+                                      </p:cBhvr>
+                                    </p:animEffect>
+                                  </p:childTnLst>
+                                </p:cTn>
+                              </p:par>
+                              <p:par>
+                                <p:cTn id="26" presetID="10" presetClass="entr" presetSubtype="0" fill="hold" grpId="0" nodeType="withEffect">
+                                  <p:stCondLst>
+                                    <p:cond delay="0"/>
+                                  </p:stCondLst>
+                                  <p:childTnLst>
+                                    <p:set>
+                                      <p:cBhvr>
+                                        <p:cTn id="27" dur="1" fill="hold">
+                                          <p:stCondLst>
+                                            <p:cond delay="0"/>
+                                          </p:stCondLst>
+                                        </p:cTn>
+                                        <p:tgtEl>
+                                          <p:spTgt spid="17"/>
+                                        </p:tgtEl>
+                                        <p:attrNameLst>
+                                          <p:attrName>style.visibility</p:attrName>
+                                        </p:attrNameLst>
+                                      </p:cBhvr>
+                                      <p:to>
+                                        <p:strVal val="visible"/>
+                                      </p:to>
+                                    </p:set>
+                                    <p:animEffect transition="in" filter="fade">
+                                      <p:cBhvr>
+                                        <p:cTn id="28" dur="500"/>
+                                        <p:tgtEl>
+                                          <p:spTgt spid="17"/>
+                                        </p:tgtEl>
+                                      </p:cBhvr>
+                                    </p:animEffect>
+                                  </p:childTnLst>
+                                </p:cTn>
+                              </p:par>
+                            </p:childTnLst>
+                          </p:cTn>
+                        </p:par>
+                      </p:childTnLst>
+                    </p:cTn>
+                  </p:par>
+                  <p:par>
+                    <p:cTn id="29" fill="hold">
+                      <p:stCondLst>
+                        <p:cond delay="indefinite"/>
+                      </p:stCondLst>
+                      <p:childTnLst>
+                        <p:par>
+                          <p:cTn id="30" fill="hold">
+                            <p:stCondLst>
+                              <p:cond delay="0"/>
+                            </p:stCondLst>
+                            <p:childTnLst>
+                              <p:par>
+                                <p:cTn id="31" presetID="10" presetClass="entr" presetSubtype="0" fill="hold" grpId="0" nodeType="clickEffect">
+                                  <p:stCondLst>
+                                    <p:cond delay="0"/>
+                                  </p:stCondLst>
+                                  <p:childTnLst>
+                                    <p:set>
+                                      <p:cBhvr>
+                                        <p:cTn id="32" dur="1" fill="hold">
+                                          <p:stCondLst>
+                                            <p:cond delay="0"/>
+                                          </p:stCondLst>
+                                        </p:cTn>
+                                        <p:tgtEl>
+                                          <p:spTgt spid="7"/>
+                                        </p:tgtEl>
+                                        <p:attrNameLst>
+                                          <p:attrName>style.visibility</p:attrName>
+                                        </p:attrNameLst>
+                                      </p:cBhvr>
+                                      <p:to>
+                                        <p:strVal val="visible"/>
+                                      </p:to>
+                                    </p:set>
+                                    <p:animEffect transition="in" filter="fade">
+                                      <p:cBhvr>
+                                        <p:cTn id="33" dur="500"/>
+                                        <p:tgtEl>
+                                          <p:spTgt spid="7"/>
+                                        </p:tgtEl>
+                                      </p:cBhvr>
+                                    </p:animEffect>
+                                  </p:childTnLst>
+                                </p:cTn>
+                              </p:par>
+                              <p:par>
+                                <p:cTn id="34" presetID="10" presetClass="entr" presetSubtype="0" fill="hold" nodeType="withEffect">
+                                  <p:stCondLst>
+                                    <p:cond delay="0"/>
+                                  </p:stCondLst>
+                                  <p:childTnLst>
+                                    <p:set>
+                                      <p:cBhvr>
+                                        <p:cTn id="35" dur="1" fill="hold">
+                                          <p:stCondLst>
+                                            <p:cond delay="0"/>
+                                          </p:stCondLst>
+                                        </p:cTn>
+                                        <p:tgtEl>
+                                          <p:spTgt spid="24"/>
+                                        </p:tgtEl>
+                                        <p:attrNameLst>
+                                          <p:attrName>style.visibility</p:attrName>
+                                        </p:attrNameLst>
+                                      </p:cBhvr>
+                                      <p:to>
+                                        <p:strVal val="visible"/>
+                                      </p:to>
+                                    </p:set>
+                                    <p:animEffect transition="in" filter="fade">
+                                      <p:cBhvr>
+                                        <p:cTn id="36" dur="500"/>
+                                        <p:tgtEl>
+                                          <p:spTgt spid="24"/>
+                                        </p:tgtEl>
+                                      </p:cBhvr>
+                                    </p:animEffect>
+                                  </p:childTnLst>
+                                </p:cTn>
+                              </p:par>
+                              <p:par>
+                                <p:cTn id="37" presetID="10" presetClass="entr" presetSubtype="0" fill="hold" grpId="0" nodeType="withEffect">
+                                  <p:stCondLst>
+                                    <p:cond delay="0"/>
+                                  </p:stCondLst>
+                                  <p:childTnLst>
+                                    <p:set>
+                                      <p:cBhvr>
+                                        <p:cTn id="38" dur="1" fill="hold">
+                                          <p:stCondLst>
+                                            <p:cond delay="0"/>
+                                          </p:stCondLst>
+                                        </p:cTn>
+                                        <p:tgtEl>
+                                          <p:spTgt spid="15"/>
+                                        </p:tgtEl>
+                                        <p:attrNameLst>
+                                          <p:attrName>style.visibility</p:attrName>
+                                        </p:attrNameLst>
+                                      </p:cBhvr>
+                                      <p:to>
+                                        <p:strVal val="visible"/>
+                                      </p:to>
+                                    </p:set>
+                                    <p:animEffect transition="in" filter="fade">
+                                      <p:cBhvr>
+                                        <p:cTn id="39" dur="500"/>
+                                        <p:tgtEl>
+                                          <p:spTgt spid="15"/>
+                                        </p:tgtEl>
+                                      </p:cBhvr>
+                                    </p:animEffect>
+                                  </p:childTnLst>
+                                </p:cTn>
+                              </p:par>
+                            </p:childTnLst>
+                          </p:cTn>
+                        </p:par>
+                      </p:childTnLst>
+                    </p:cTn>
+                  </p:par>
+                  <p:par>
+                    <p:cTn id="40" fill="hold">
+                      <p:stCondLst>
+                        <p:cond delay="indefinite"/>
+                      </p:stCondLst>
+                      <p:childTnLst>
+                        <p:par>
+                          <p:cTn id="41" fill="hold">
+                            <p:stCondLst>
+                              <p:cond delay="0"/>
+                            </p:stCondLst>
+                            <p:childTnLst>
+                              <p:par>
+                                <p:cTn id="42" presetID="10" presetClass="entr" presetSubtype="0" fill="hold" grpId="0" nodeType="clickEffect">
+                                  <p:stCondLst>
+                                    <p:cond delay="0"/>
+                                  </p:stCondLst>
+                                  <p:childTnLst>
+                                    <p:set>
+                                      <p:cBhvr>
+                                        <p:cTn id="43" dur="1" fill="hold">
+                                          <p:stCondLst>
+                                            <p:cond delay="0"/>
+                                          </p:stCondLst>
+                                        </p:cTn>
+                                        <p:tgtEl>
+                                          <p:spTgt spid="11"/>
+                                        </p:tgtEl>
+                                        <p:attrNameLst>
+                                          <p:attrName>style.visibility</p:attrName>
+                                        </p:attrNameLst>
+                                      </p:cBhvr>
+                                      <p:to>
+                                        <p:strVal val="visible"/>
+                                      </p:to>
+                                    </p:set>
+                                    <p:animEffect transition="in" filter="fade">
+                                      <p:cBhvr>
+                                        <p:cTn id="44" dur="500"/>
+                                        <p:tgtEl>
+                                          <p:spTgt spid="11"/>
+                                        </p:tgtEl>
+                                      </p:cBhvr>
+                                    </p:animEffect>
+                                  </p:childTnLst>
+                                </p:cTn>
+                              </p:par>
+                              <p:par>
+                                <p:cTn id="45" presetID="10" presetClass="entr" presetSubtype="0" fill="hold" nodeType="withEffect">
+                                  <p:stCondLst>
+                                    <p:cond delay="0"/>
+                                  </p:stCondLst>
+                                  <p:childTnLst>
+                                    <p:set>
+                                      <p:cBhvr>
+                                        <p:cTn id="46" dur="1" fill="hold">
+                                          <p:stCondLst>
+                                            <p:cond delay="0"/>
+                                          </p:stCondLst>
+                                        </p:cTn>
+                                        <p:tgtEl>
+                                          <p:spTgt spid="14"/>
+                                        </p:tgtEl>
+                                        <p:attrNameLst>
+                                          <p:attrName>style.visibility</p:attrName>
+                                        </p:attrNameLst>
+                                      </p:cBhvr>
+                                      <p:to>
+                                        <p:strVal val="visible"/>
+                                      </p:to>
+                                    </p:set>
+                                    <p:animEffect transition="in" filter="fade">
+                                      <p:cBhvr>
+                                        <p:cTn id="47" dur="500"/>
+                                        <p:tgtEl>
+                                          <p:spTgt spid="14"/>
+                                        </p:tgtEl>
+                                      </p:cBhvr>
+                                    </p:animEffect>
+                                  </p:childTnLst>
+                                </p:cTn>
+                              </p:par>
+                            </p:childTnLst>
+                          </p:cTn>
+                        </p:par>
+                      </p:childTnLst>
+                    </p:cTn>
+                  </p:par>
+                </p:childTnLst>
+              </p:cTn>
+              <p:prevCondLst>
+                <p:cond evt="onPrev" delay="0">
+                  <p:tgtEl>
+                    <p:sldTgt/>
+                  </p:tgtEl>
+                </p:cond>
+              </p:prevCondLst>
+              <p:nextCondLst>
+                <p:cond evt="onNext" delay="0">
+                  <p:tgtEl>
+                    <p:sldTgt/>
+                  </p:tgtEl>
+                </p:cond>
+              </p:nextCondLst>
+            </p:seq>
+          </p:childTnLst>
+        </p:cTn>
+      </p:par>
+    </p:tnLst>
+    <p:bldLst>
+      <p:bldP spid="7" grpId="0" animBg="1"/>
+      <p:bldP spid="9" grpId="0" animBg="1"/>
+      <p:bldP spid="11" grpId="0" animBg="1"/>
+      <p:bldP spid="15" grpId="0" animBg="1"/>
+      <p:bldP spid="17" grpId="0" animBg="1"/>
+      <p:bldP spid="22" grpId="0" animBg="1"/>
+    </p:bldLst>
+  </p:timing>
+</p:sld>
+</file>
+
+<file path=ppt/slides/slide17.xml><?xml version="1.0" encoding="utf-8"?>
+<p:sld xmlns:a="http://schemas.openxmlformats.org/drawingml/2006/main" xmlns:r="http://schemas.openxmlformats.org/officeDocument/2006/relationships" xmlns:p="http://schemas.openxmlformats.org/presentationml/2006/main">
+  <p:cSld>
+    <p:spTree>
+      <p:nvGrpSpPr>
+        <p:cNvPr id="1" name=""/>
+        <p:cNvGrpSpPr/>
+        <p:nvPr/>
+      </p:nvGrpSpPr>
+      <p:grpSpPr>
+        <a:xfrm>
+          <a:off x="0" y="0"/>
+          <a:ext cx="0" cy="0"/>
+          <a:chOff x="0" y="0"/>
+          <a:chExt cx="0" cy="0"/>
+        </a:xfrm>
+      </p:grpSpPr>
+      <p:sp>
+        <p:nvSpPr>
           <p:cNvPr id="5" name="ZoneTexte 4"/>
           <p:cNvSpPr txBox="1"/>
           <p:nvPr/>
@@ -9854,7 +11217,7 @@
 </p:sld>
 </file>
 
-<file path=ppt/slides/slide17.xml><?xml version="1.0" encoding="utf-8"?>
+<file path=ppt/slides/slide18.xml><?xml version="1.0" encoding="utf-8"?>
 <p:sld xmlns:a="http://schemas.openxmlformats.org/drawingml/2006/main" xmlns:r="http://schemas.openxmlformats.org/officeDocument/2006/relationships" xmlns:p="http://schemas.openxmlformats.org/presentationml/2006/main">
   <p:cSld>
     <p:spTree>
@@ -10092,7 +11455,7 @@
 </p:sld>
 </file>
 
-<file path=ppt/slides/slide18.xml><?xml version="1.0" encoding="utf-8"?>
+<file path=ppt/slides/slide19.xml><?xml version="1.0" encoding="utf-8"?>
 <p:sld xmlns:a="http://schemas.openxmlformats.org/drawingml/2006/main" xmlns:r="http://schemas.openxmlformats.org/officeDocument/2006/relationships" xmlns:p="http://schemas.openxmlformats.org/presentationml/2006/main">
   <p:cSld>
     <p:spTree>
@@ -10452,93 +11815,6 @@
 </p:sld>
 </file>
 
-<file path=ppt/slides/slide19.xml><?xml version="1.0" encoding="utf-8"?>
-<p:sld xmlns:a="http://schemas.openxmlformats.org/drawingml/2006/main" xmlns:r="http://schemas.openxmlformats.org/officeDocument/2006/relationships" xmlns:p="http://schemas.openxmlformats.org/presentationml/2006/main">
-  <p:cSld>
-    <p:spTree>
-      <p:nvGrpSpPr>
-        <p:cNvPr id="1" name=""/>
-        <p:cNvGrpSpPr/>
-        <p:nvPr/>
-      </p:nvGrpSpPr>
-      <p:grpSpPr>
-        <a:xfrm>
-          <a:off x="0" y="0"/>
-          <a:ext cx="0" cy="0"/>
-          <a:chOff x="0" y="0"/>
-          <a:chExt cx="0" cy="0"/>
-        </a:xfrm>
-      </p:grpSpPr>
-      <p:sp>
-        <p:nvSpPr>
-          <p:cNvPr id="5" name="ZoneTexte 4"/>
-          <p:cNvSpPr txBox="1"/>
-          <p:nvPr/>
-        </p:nvSpPr>
-        <p:spPr>
-          <a:xfrm>
-            <a:off x="401443" y="689145"/>
-            <a:ext cx="11790557" cy="1938992"/>
-          </a:xfrm>
-          <a:prstGeom prst="rect">
-            <a:avLst/>
-          </a:prstGeom>
-          <a:noFill/>
-        </p:spPr>
-        <p:txBody>
-          <a:bodyPr wrap="square" rtlCol="0">
-            <a:spAutoFit/>
-          </a:bodyPr>
-          <a:lstStyle/>
-          <a:p>
-            <a:r>
-              <a:rPr lang="fr-FR" sz="6000" dirty="0" smtClean="0">
-                <a:latin typeface="Calibri" panose="020F0502020204030204" pitchFamily="34" charset="0"/>
-                <a:cs typeface="Courier New" panose="02070309020205020404" pitchFamily="49" charset="0"/>
-              </a:rPr>
-              <a:t>Comment la </a:t>
-            </a:r>
-            <a:r>
-              <a:rPr lang="fr-FR" sz="6000" dirty="0" err="1" smtClean="0">
-                <a:latin typeface="Calibri" panose="020F0502020204030204" pitchFamily="34" charset="0"/>
-                <a:cs typeface="Courier New" panose="02070309020205020404" pitchFamily="49" charset="0"/>
-              </a:rPr>
-              <a:t>métaclasse</a:t>
-            </a:r>
-            <a:r>
-              <a:rPr lang="fr-FR" sz="6000" dirty="0" smtClean="0">
-                <a:latin typeface="Calibri" panose="020F0502020204030204" pitchFamily="34" charset="0"/>
-                <a:cs typeface="Courier New" panose="02070309020205020404" pitchFamily="49" charset="0"/>
-              </a:rPr>
-              <a:t> crée l’objet classe ?</a:t>
-            </a:r>
-            <a:endParaRPr lang="fr-FR" sz="5400" dirty="0" smtClean="0">
-              <a:latin typeface="Calibri" panose="020F0502020204030204" pitchFamily="34" charset="0"/>
-              <a:cs typeface="Courier New" panose="02070309020205020404" pitchFamily="49" charset="0"/>
-            </a:endParaRPr>
-          </a:p>
-        </p:txBody>
-      </p:sp>
-    </p:spTree>
-    <p:extLst>
-      <p:ext uri="{BB962C8B-B14F-4D97-AF65-F5344CB8AC3E}">
-        <p14:creationId xmlns:p14="http://schemas.microsoft.com/office/powerpoint/2010/main" val="955377406"/>
-      </p:ext>
-    </p:extLst>
-  </p:cSld>
-  <p:clrMapOvr>
-    <a:masterClrMapping/>
-  </p:clrMapOvr>
-  <p:timing>
-    <p:tnLst>
-      <p:par>
-        <p:cTn id="1" dur="indefinite" restart="never" nodeType="tmRoot"/>
-      </p:par>
-    </p:tnLst>
-  </p:timing>
-</p:sld>
-</file>
-
 <file path=ppt/slides/slide2.xml><?xml version="1.0" encoding="utf-8"?>
 <p:sld xmlns:a="http://schemas.openxmlformats.org/drawingml/2006/main" xmlns:r="http://schemas.openxmlformats.org/officeDocument/2006/relationships" xmlns:p="http://schemas.openxmlformats.org/presentationml/2006/main">
   <p:cSld>
@@ -10611,6 +11887,93 @@
 </file>
 
 <file path=ppt/slides/slide20.xml><?xml version="1.0" encoding="utf-8"?>
+<p:sld xmlns:a="http://schemas.openxmlformats.org/drawingml/2006/main" xmlns:r="http://schemas.openxmlformats.org/officeDocument/2006/relationships" xmlns:p="http://schemas.openxmlformats.org/presentationml/2006/main">
+  <p:cSld>
+    <p:spTree>
+      <p:nvGrpSpPr>
+        <p:cNvPr id="1" name=""/>
+        <p:cNvGrpSpPr/>
+        <p:nvPr/>
+      </p:nvGrpSpPr>
+      <p:grpSpPr>
+        <a:xfrm>
+          <a:off x="0" y="0"/>
+          <a:ext cx="0" cy="0"/>
+          <a:chOff x="0" y="0"/>
+          <a:chExt cx="0" cy="0"/>
+        </a:xfrm>
+      </p:grpSpPr>
+      <p:sp>
+        <p:nvSpPr>
+          <p:cNvPr id="5" name="ZoneTexte 4"/>
+          <p:cNvSpPr txBox="1"/>
+          <p:nvPr/>
+        </p:nvSpPr>
+        <p:spPr>
+          <a:xfrm>
+            <a:off x="401443" y="689145"/>
+            <a:ext cx="11790557" cy="1938992"/>
+          </a:xfrm>
+          <a:prstGeom prst="rect">
+            <a:avLst/>
+          </a:prstGeom>
+          <a:noFill/>
+        </p:spPr>
+        <p:txBody>
+          <a:bodyPr wrap="square" rtlCol="0">
+            <a:spAutoFit/>
+          </a:bodyPr>
+          <a:lstStyle/>
+          <a:p>
+            <a:r>
+              <a:rPr lang="fr-FR" sz="6000" dirty="0" smtClean="0">
+                <a:latin typeface="Calibri" panose="020F0502020204030204" pitchFamily="34" charset="0"/>
+                <a:cs typeface="Courier New" panose="02070309020205020404" pitchFamily="49" charset="0"/>
+              </a:rPr>
+              <a:t>Comment la </a:t>
+            </a:r>
+            <a:r>
+              <a:rPr lang="fr-FR" sz="6000" dirty="0" err="1" smtClean="0">
+                <a:latin typeface="Calibri" panose="020F0502020204030204" pitchFamily="34" charset="0"/>
+                <a:cs typeface="Courier New" panose="02070309020205020404" pitchFamily="49" charset="0"/>
+              </a:rPr>
+              <a:t>métaclasse</a:t>
+            </a:r>
+            <a:r>
+              <a:rPr lang="fr-FR" sz="6000" dirty="0" smtClean="0">
+                <a:latin typeface="Calibri" panose="020F0502020204030204" pitchFamily="34" charset="0"/>
+                <a:cs typeface="Courier New" panose="02070309020205020404" pitchFamily="49" charset="0"/>
+              </a:rPr>
+              <a:t> crée l’objet classe ?</a:t>
+            </a:r>
+            <a:endParaRPr lang="fr-FR" sz="5400" dirty="0" smtClean="0">
+              <a:latin typeface="Calibri" panose="020F0502020204030204" pitchFamily="34" charset="0"/>
+              <a:cs typeface="Courier New" panose="02070309020205020404" pitchFamily="49" charset="0"/>
+            </a:endParaRPr>
+          </a:p>
+        </p:txBody>
+      </p:sp>
+    </p:spTree>
+    <p:extLst>
+      <p:ext uri="{BB962C8B-B14F-4D97-AF65-F5344CB8AC3E}">
+        <p14:creationId xmlns:p14="http://schemas.microsoft.com/office/powerpoint/2010/main" val="955377406"/>
+      </p:ext>
+    </p:extLst>
+  </p:cSld>
+  <p:clrMapOvr>
+    <a:masterClrMapping/>
+  </p:clrMapOvr>
+  <p:timing>
+    <p:tnLst>
+      <p:par>
+        <p:cTn id="1" dur="indefinite" restart="never" nodeType="tmRoot"/>
+      </p:par>
+    </p:tnLst>
+  </p:timing>
+</p:sld>
+</file>
+
+<file path=ppt/slides/slide21.xml><?xml version="1.0" encoding="utf-8"?>
 <p:sld xmlns:a="http://schemas.openxmlformats.org/drawingml/2006/main" xmlns:r="http://schemas.openxmlformats.org/officeDocument/2006/relationships" xmlns:p="http://schemas.openxmlformats.org/presentationml/2006/main">
   <p:cSld>
     <p:spTree>
@@ -11689,286 +13052,6 @@
 </p:sld>
 </file>
 
-<file path=ppt/slides/slide21.xml><?xml version="1.0" encoding="utf-8"?>
-<p:sld xmlns:a="http://schemas.openxmlformats.org/drawingml/2006/main" xmlns:r="http://schemas.openxmlformats.org/officeDocument/2006/relationships" xmlns:p="http://schemas.openxmlformats.org/presentationml/2006/main">
-  <p:cSld>
-    <p:spTree>
-      <p:nvGrpSpPr>
-        <p:cNvPr id="1" name=""/>
-        <p:cNvGrpSpPr/>
-        <p:nvPr/>
-      </p:nvGrpSpPr>
-      <p:grpSpPr>
-        <a:xfrm>
-          <a:off x="0" y="0"/>
-          <a:ext cx="0" cy="0"/>
-          <a:chOff x="0" y="0"/>
-          <a:chExt cx="0" cy="0"/>
-        </a:xfrm>
-      </p:grpSpPr>
-      <p:sp>
-        <p:nvSpPr>
-          <p:cNvPr id="5" name="ZoneTexte 4"/>
-          <p:cNvSpPr txBox="1"/>
-          <p:nvPr/>
-        </p:nvSpPr>
-        <p:spPr>
-          <a:xfrm>
-            <a:off x="401443" y="689145"/>
-            <a:ext cx="11790557" cy="5416868"/>
-          </a:xfrm>
-          <a:prstGeom prst="rect">
-            <a:avLst/>
-          </a:prstGeom>
-          <a:noFill/>
-        </p:spPr>
-        <p:txBody>
-          <a:bodyPr wrap="square" rtlCol="0">
-            <a:spAutoFit/>
-          </a:bodyPr>
-          <a:lstStyle/>
-          <a:p>
-            <a:r>
-              <a:rPr lang="fr-FR" sz="6000" dirty="0" smtClean="0">
-                <a:latin typeface="Calibri" panose="020F0502020204030204" pitchFamily="34" charset="0"/>
-                <a:cs typeface="Courier New" panose="02070309020205020404" pitchFamily="49" charset="0"/>
-              </a:rPr>
-              <a:t>Que fait l’appel </a:t>
-            </a:r>
-          </a:p>
-          <a:p>
-            <a:r>
-              <a:rPr lang="fr-FR" sz="6000" dirty="0" smtClean="0">
-                <a:latin typeface="Courier New" panose="02070309020205020404" pitchFamily="49" charset="0"/>
-                <a:cs typeface="Courier New" panose="02070309020205020404" pitchFamily="49" charset="0"/>
-              </a:rPr>
-              <a:t>type(</a:t>
-            </a:r>
-            <a:r>
-              <a:rPr lang="fr-FR" sz="6000" dirty="0" err="1" smtClean="0">
-                <a:latin typeface="Courier New" panose="02070309020205020404" pitchFamily="49" charset="0"/>
-                <a:cs typeface="Courier New" panose="02070309020205020404" pitchFamily="49" charset="0"/>
-              </a:rPr>
-              <a:t>name</a:t>
-            </a:r>
-            <a:r>
-              <a:rPr lang="fr-FR" sz="6000" dirty="0">
-                <a:latin typeface="Courier New" panose="02070309020205020404" pitchFamily="49" charset="0"/>
-                <a:cs typeface="Courier New" panose="02070309020205020404" pitchFamily="49" charset="0"/>
-              </a:rPr>
-              <a:t>, bases, </a:t>
-            </a:r>
-            <a:r>
-              <a:rPr lang="fr-FR" sz="6000" dirty="0" err="1">
-                <a:latin typeface="Courier New" panose="02070309020205020404" pitchFamily="49" charset="0"/>
-                <a:cs typeface="Courier New" panose="02070309020205020404" pitchFamily="49" charset="0"/>
-              </a:rPr>
-              <a:t>dict</a:t>
-            </a:r>
-            <a:r>
-              <a:rPr lang="fr-FR" sz="6000" dirty="0">
-                <a:latin typeface="Courier New" panose="02070309020205020404" pitchFamily="49" charset="0"/>
-                <a:cs typeface="Courier New" panose="02070309020205020404" pitchFamily="49" charset="0"/>
-              </a:rPr>
-              <a:t>)</a:t>
-            </a:r>
-            <a:r>
-              <a:rPr lang="fr-FR" sz="6000" dirty="0">
-                <a:latin typeface="Calibri" panose="020F0502020204030204" pitchFamily="34" charset="0"/>
-                <a:cs typeface="Courier New" panose="02070309020205020404" pitchFamily="49" charset="0"/>
-              </a:rPr>
-              <a:t> </a:t>
-            </a:r>
-            <a:r>
-              <a:rPr lang="fr-FR" sz="6000" dirty="0" smtClean="0">
-                <a:latin typeface="Calibri" panose="020F0502020204030204" pitchFamily="34" charset="0"/>
-                <a:cs typeface="Courier New" panose="02070309020205020404" pitchFamily="49" charset="0"/>
-              </a:rPr>
-              <a:t>?</a:t>
-            </a:r>
-          </a:p>
-          <a:p>
-            <a:pPr marL="1143000" lvl="1" indent="-685800">
-              <a:buFont typeface="Arial" panose="020B0604020202020204" pitchFamily="34" charset="0"/>
-              <a:buChar char="•"/>
-            </a:pPr>
-            <a:r>
-              <a:rPr lang="fr-FR" sz="5400" dirty="0" smtClean="0">
-                <a:latin typeface="Calibri" panose="020F0502020204030204" pitchFamily="34" charset="0"/>
-                <a:cs typeface="Courier New" panose="02070309020205020404" pitchFamily="49" charset="0"/>
-              </a:rPr>
-              <a:t>Appel de </a:t>
-            </a:r>
-            <a:r>
-              <a:rPr lang="fr-FR" sz="5400" dirty="0" smtClean="0">
-                <a:latin typeface="Courier New" panose="02070309020205020404" pitchFamily="49" charset="0"/>
-                <a:cs typeface="Courier New" panose="02070309020205020404" pitchFamily="49" charset="0"/>
-              </a:rPr>
-              <a:t>__call__ </a:t>
-            </a:r>
-            <a:r>
-              <a:rPr lang="fr-FR" sz="5400" dirty="0" smtClean="0">
-                <a:latin typeface="Calibri" panose="020F0502020204030204" pitchFamily="34" charset="0"/>
-                <a:cs typeface="Courier New" panose="02070309020205020404" pitchFamily="49" charset="0"/>
-              </a:rPr>
-              <a:t>sur l’objet </a:t>
-            </a:r>
-            <a:r>
-              <a:rPr lang="fr-FR" sz="5400" dirty="0" smtClean="0">
-                <a:solidFill>
-                  <a:srgbClr val="00B050"/>
-                </a:solidFill>
-                <a:latin typeface="Courier New" panose="02070309020205020404" pitchFamily="49" charset="0"/>
-                <a:cs typeface="Courier New" panose="02070309020205020404" pitchFamily="49" charset="0"/>
-              </a:rPr>
-              <a:t>type</a:t>
-            </a:r>
-          </a:p>
-          <a:p>
-            <a:pPr lvl="1"/>
-            <a:endParaRPr lang="fr-FR" sz="5400" dirty="0">
-              <a:solidFill>
-                <a:srgbClr val="00B050"/>
-              </a:solidFill>
-              <a:latin typeface="Courier New" panose="02070309020205020404" pitchFamily="49" charset="0"/>
-              <a:cs typeface="Courier New" panose="02070309020205020404" pitchFamily="49" charset="0"/>
-            </a:endParaRPr>
-          </a:p>
-          <a:p>
-            <a:r>
-              <a:rPr lang="en-US" sz="3200" dirty="0" err="1">
-                <a:latin typeface="Courier New" panose="02070309020205020404" pitchFamily="49" charset="0"/>
-                <a:cs typeface="Courier New" panose="02070309020205020404" pitchFamily="49" charset="0"/>
-              </a:rPr>
-              <a:t>cls</a:t>
-            </a:r>
-            <a:r>
-              <a:rPr lang="en-US" sz="3200" dirty="0">
-                <a:latin typeface="Courier New" panose="02070309020205020404" pitchFamily="49" charset="0"/>
-                <a:cs typeface="Courier New" panose="02070309020205020404" pitchFamily="49" charset="0"/>
-              </a:rPr>
-              <a:t> = </a:t>
-            </a:r>
-            <a:r>
-              <a:rPr lang="en-US" sz="3200" dirty="0" err="1" smtClean="0">
-                <a:latin typeface="Courier New" panose="02070309020205020404" pitchFamily="49" charset="0"/>
-                <a:cs typeface="Courier New" panose="02070309020205020404" pitchFamily="49" charset="0"/>
-              </a:rPr>
-              <a:t>type.__</a:t>
-            </a:r>
-            <a:r>
-              <a:rPr lang="en-US" sz="3200" dirty="0" err="1">
-                <a:latin typeface="Courier New" panose="02070309020205020404" pitchFamily="49" charset="0"/>
-                <a:cs typeface="Courier New" panose="02070309020205020404" pitchFamily="49" charset="0"/>
-              </a:rPr>
-              <a:t>new</a:t>
-            </a:r>
-            <a:r>
-              <a:rPr lang="en-US" sz="3200" dirty="0" smtClean="0">
-                <a:latin typeface="Courier New" panose="02070309020205020404" pitchFamily="49" charset="0"/>
-                <a:cs typeface="Courier New" panose="02070309020205020404" pitchFamily="49" charset="0"/>
-              </a:rPr>
-              <a:t>__(type, </a:t>
-            </a:r>
-            <a:r>
-              <a:rPr lang="en-US" sz="3200" dirty="0">
-                <a:latin typeface="Courier New" panose="02070309020205020404" pitchFamily="49" charset="0"/>
-                <a:cs typeface="Courier New" panose="02070309020205020404" pitchFamily="49" charset="0"/>
-              </a:rPr>
-              <a:t>name, bases, </a:t>
-            </a:r>
-            <a:r>
-              <a:rPr lang="en-US" sz="3200" dirty="0" err="1">
-                <a:latin typeface="Courier New" panose="02070309020205020404" pitchFamily="49" charset="0"/>
-                <a:cs typeface="Courier New" panose="02070309020205020404" pitchFamily="49" charset="0"/>
-              </a:rPr>
-              <a:t>dict</a:t>
-            </a:r>
-            <a:r>
-              <a:rPr lang="en-US" sz="3200" dirty="0">
-                <a:latin typeface="Courier New" panose="02070309020205020404" pitchFamily="49" charset="0"/>
-                <a:cs typeface="Courier New" panose="02070309020205020404" pitchFamily="49" charset="0"/>
-              </a:rPr>
-              <a:t>)</a:t>
-            </a:r>
-          </a:p>
-          <a:p>
-            <a:r>
-              <a:rPr lang="en-US" sz="3200" dirty="0" smtClean="0">
-                <a:latin typeface="Courier New" panose="02070309020205020404" pitchFamily="49" charset="0"/>
-                <a:cs typeface="Courier New" panose="02070309020205020404" pitchFamily="49" charset="0"/>
-              </a:rPr>
-              <a:t>type.__</a:t>
-            </a:r>
-            <a:r>
-              <a:rPr lang="en-US" sz="3200" dirty="0" err="1">
-                <a:latin typeface="Courier New" panose="02070309020205020404" pitchFamily="49" charset="0"/>
-                <a:cs typeface="Courier New" panose="02070309020205020404" pitchFamily="49" charset="0"/>
-              </a:rPr>
-              <a:t>init</a:t>
-            </a:r>
-            <a:r>
-              <a:rPr lang="en-US" sz="3200" dirty="0">
-                <a:latin typeface="Courier New" panose="02070309020205020404" pitchFamily="49" charset="0"/>
-                <a:cs typeface="Courier New" panose="02070309020205020404" pitchFamily="49" charset="0"/>
-              </a:rPr>
-              <a:t>__(</a:t>
-            </a:r>
-            <a:r>
-              <a:rPr lang="en-US" sz="3200" dirty="0" err="1">
-                <a:latin typeface="Courier New" panose="02070309020205020404" pitchFamily="49" charset="0"/>
-                <a:cs typeface="Courier New" panose="02070309020205020404" pitchFamily="49" charset="0"/>
-              </a:rPr>
-              <a:t>cls</a:t>
-            </a:r>
-            <a:r>
-              <a:rPr lang="en-US" sz="3200" dirty="0">
-                <a:latin typeface="Courier New" panose="02070309020205020404" pitchFamily="49" charset="0"/>
-                <a:cs typeface="Courier New" panose="02070309020205020404" pitchFamily="49" charset="0"/>
-              </a:rPr>
-              <a:t>, name, bases, </a:t>
-            </a:r>
-            <a:r>
-              <a:rPr lang="en-US" sz="3200" dirty="0" err="1">
-                <a:latin typeface="Courier New" panose="02070309020205020404" pitchFamily="49" charset="0"/>
-                <a:cs typeface="Courier New" panose="02070309020205020404" pitchFamily="49" charset="0"/>
-              </a:rPr>
-              <a:t>dict</a:t>
-            </a:r>
-            <a:r>
-              <a:rPr lang="en-US" sz="3200" dirty="0">
-                <a:latin typeface="Courier New" panose="02070309020205020404" pitchFamily="49" charset="0"/>
-                <a:cs typeface="Courier New" panose="02070309020205020404" pitchFamily="49" charset="0"/>
-              </a:rPr>
-              <a:t>)</a:t>
-            </a:r>
-            <a:endParaRPr lang="fr-FR" sz="3200" dirty="0" smtClean="0">
-              <a:latin typeface="Courier New" panose="02070309020205020404" pitchFamily="49" charset="0"/>
-              <a:cs typeface="Courier New" panose="02070309020205020404" pitchFamily="49" charset="0"/>
-            </a:endParaRPr>
-          </a:p>
-        </p:txBody>
-      </p:sp>
-    </p:spTree>
-    <p:extLst>
-      <p:ext uri="{BB962C8B-B14F-4D97-AF65-F5344CB8AC3E}">
-        <p14:creationId xmlns:p14="http://schemas.microsoft.com/office/powerpoint/2010/main" val="1807560953"/>
-      </p:ext>
-    </p:extLst>
-  </p:cSld>
-  <p:clrMapOvr>
-    <a:masterClrMapping/>
-  </p:clrMapOvr>
-  <p:timing>
-    <p:tnLst>
-      <p:par>
-        <p:cTn id="1" dur="indefinite" restart="never" nodeType="tmRoot"/>
-      </p:par>
-    </p:tnLst>
-  </p:timing>
-</p:sld>
-</file>
-
 <file path=ppt/slides/slide22.xml><?xml version="1.0" encoding="utf-8"?>
 <p:sld xmlns:a="http://schemas.openxmlformats.org/drawingml/2006/main" xmlns:r="http://schemas.openxmlformats.org/officeDocument/2006/relationships" xmlns:p="http://schemas.openxmlformats.org/presentationml/2006/main">
   <p:cSld>
@@ -11994,8 +13077,8 @@
         </p:nvSpPr>
         <p:spPr>
           <a:xfrm>
-            <a:off x="401443" y="572766"/>
-            <a:ext cx="11790557" cy="3600986"/>
+            <a:off x="401443" y="689145"/>
+            <a:ext cx="11790557" cy="5416868"/>
           </a:xfrm>
           <a:prstGeom prst="rect">
             <a:avLst/>
@@ -12009,70 +13092,63 @@
           <a:lstStyle/>
           <a:p>
             <a:r>
-              <a:rPr lang="fr-FR" sz="4800" dirty="0" smtClean="0">
-                <a:latin typeface="Courier New" panose="02070309020205020404" pitchFamily="49" charset="0"/>
-                <a:cs typeface="Courier New" panose="02070309020205020404" pitchFamily="49" charset="0"/>
-              </a:rPr>
-              <a:t>__new__ </a:t>
-            </a:r>
-            <a:r>
-              <a:rPr lang="fr-FR" sz="4800" dirty="0">
+              <a:rPr lang="fr-FR" sz="6000" dirty="0" smtClean="0">
                 <a:latin typeface="Calibri" panose="020F0502020204030204" pitchFamily="34" charset="0"/>
                 <a:cs typeface="Courier New" panose="02070309020205020404" pitchFamily="49" charset="0"/>
               </a:rPr>
-              <a:t>crée l’objet classe</a:t>
-            </a:r>
-            <a:endParaRPr lang="fr-FR" sz="4800" dirty="0" smtClean="0">
-              <a:latin typeface="Calibri" panose="020F0502020204030204" pitchFamily="34" charset="0"/>
-              <a:cs typeface="Courier New" panose="02070309020205020404" pitchFamily="49" charset="0"/>
-            </a:endParaRPr>
-          </a:p>
-          <a:p>
-            <a:pPr marL="1314450" lvl="1" indent="-857250">
-              <a:buFont typeface="Arial" panose="020B0604020202020204" pitchFamily="34" charset="0"/>
-              <a:buChar char="•"/>
-            </a:pPr>
-            <a:r>
-              <a:rPr lang="fr-FR" sz="4400" dirty="0" smtClean="0">
+              <a:t>Que fait l’appel </a:t>
+            </a:r>
+          </a:p>
+          <a:p>
+            <a:r>
+              <a:rPr lang="fr-FR" sz="6000" dirty="0" smtClean="0">
+                <a:latin typeface="Courier New" panose="02070309020205020404" pitchFamily="49" charset="0"/>
+                <a:cs typeface="Courier New" panose="02070309020205020404" pitchFamily="49" charset="0"/>
+              </a:rPr>
+              <a:t>type(</a:t>
+            </a:r>
+            <a:r>
+              <a:rPr lang="fr-FR" sz="6000" dirty="0" err="1" smtClean="0">
+                <a:latin typeface="Courier New" panose="02070309020205020404" pitchFamily="49" charset="0"/>
+                <a:cs typeface="Courier New" panose="02070309020205020404" pitchFamily="49" charset="0"/>
+              </a:rPr>
+              <a:t>name</a:t>
+            </a:r>
+            <a:r>
+              <a:rPr lang="fr-FR" sz="6000" dirty="0">
+                <a:latin typeface="Courier New" panose="02070309020205020404" pitchFamily="49" charset="0"/>
+                <a:cs typeface="Courier New" panose="02070309020205020404" pitchFamily="49" charset="0"/>
+              </a:rPr>
+              <a:t>, bases, </a:t>
+            </a:r>
+            <a:r>
+              <a:rPr lang="fr-FR" sz="6000" dirty="0" err="1">
+                <a:latin typeface="Courier New" panose="02070309020205020404" pitchFamily="49" charset="0"/>
+                <a:cs typeface="Courier New" panose="02070309020205020404" pitchFamily="49" charset="0"/>
+              </a:rPr>
+              <a:t>dict</a:t>
+            </a:r>
+            <a:r>
+              <a:rPr lang="fr-FR" sz="6000" dirty="0">
+                <a:latin typeface="Courier New" panose="02070309020205020404" pitchFamily="49" charset="0"/>
+                <a:cs typeface="Courier New" panose="02070309020205020404" pitchFamily="49" charset="0"/>
+              </a:rPr>
+              <a:t>)</a:t>
+            </a:r>
+            <a:r>
+              <a:rPr lang="fr-FR" sz="6000" dirty="0">
                 <a:latin typeface="Calibri" panose="020F0502020204030204" pitchFamily="34" charset="0"/>
                 <a:cs typeface="Courier New" panose="02070309020205020404" pitchFamily="49" charset="0"/>
               </a:rPr>
-              <a:t>Utile pour modifier l’espace de nommage ou les superclasses avant la création de la classe</a:t>
-            </a:r>
-          </a:p>
-          <a:p>
-            <a:r>
-              <a:rPr lang="fr-FR" sz="4800" dirty="0" smtClean="0">
-                <a:latin typeface="Courier New" panose="02070309020205020404" pitchFamily="49" charset="0"/>
-                <a:cs typeface="Courier New" panose="02070309020205020404" pitchFamily="49" charset="0"/>
-              </a:rPr>
-              <a:t>__</a:t>
-            </a:r>
-            <a:r>
-              <a:rPr lang="fr-FR" sz="4800" dirty="0" err="1" smtClean="0">
-                <a:latin typeface="Courier New" panose="02070309020205020404" pitchFamily="49" charset="0"/>
-                <a:cs typeface="Courier New" panose="02070309020205020404" pitchFamily="49" charset="0"/>
-              </a:rPr>
-              <a:t>init</a:t>
-            </a:r>
-            <a:r>
-              <a:rPr lang="fr-FR" sz="4800" dirty="0" smtClean="0">
-                <a:latin typeface="Courier New" panose="02070309020205020404" pitchFamily="49" charset="0"/>
-                <a:cs typeface="Courier New" panose="02070309020205020404" pitchFamily="49" charset="0"/>
-              </a:rPr>
-              <a:t>__ </a:t>
-            </a:r>
-            <a:r>
-              <a:rPr lang="fr-FR" sz="4800" dirty="0">
+              <a:t> </a:t>
+            </a:r>
+            <a:r>
+              <a:rPr lang="fr-FR" sz="6000" dirty="0" smtClean="0">
                 <a:latin typeface="Calibri" panose="020F0502020204030204" pitchFamily="34" charset="0"/>
                 <a:cs typeface="Courier New" panose="02070309020205020404" pitchFamily="49" charset="0"/>
               </a:rPr>
-              <a:t>initialise l’objet classe</a:t>
-            </a:r>
-            <a:endParaRPr lang="fr-FR" sz="4800" dirty="0" smtClean="0">
-              <a:latin typeface="Calibri" panose="020F0502020204030204" pitchFamily="34" charset="0"/>
-              <a:cs typeface="Courier New" panose="02070309020205020404" pitchFamily="49" charset="0"/>
-            </a:endParaRPr>
+              <a:t>?</a:t>
+            </a:r>
           </a:p>
           <a:p>
             <a:pPr marL="1143000" lvl="1" indent="-685800">
@@ -12080,23 +13156,166 @@
               <a:buChar char="•"/>
             </a:pPr>
             <a:r>
-              <a:rPr lang="fr-FR" sz="4400" dirty="0" smtClean="0">
+              <a:rPr lang="fr-FR" sz="5400" dirty="0" smtClean="0">
                 <a:latin typeface="Calibri" panose="020F0502020204030204" pitchFamily="34" charset="0"/>
                 <a:cs typeface="Courier New" panose="02070309020205020404" pitchFamily="49" charset="0"/>
               </a:rPr>
-              <a:t>Utile pour modifier la classe après sa création</a:t>
-            </a:r>
-            <a:endParaRPr lang="fr-FR" sz="4400" dirty="0" smtClean="0">
+              <a:t>Appel de </a:t>
+            </a:r>
+            <a:r>
+              <a:rPr lang="fr-FR" sz="5400" dirty="0" smtClean="0">
+                <a:latin typeface="Courier New" panose="02070309020205020404" pitchFamily="49" charset="0"/>
+                <a:cs typeface="Courier New" panose="02070309020205020404" pitchFamily="49" charset="0"/>
+              </a:rPr>
+              <a:t>__call__ </a:t>
+            </a:r>
+            <a:r>
+              <a:rPr lang="fr-FR" sz="5400" dirty="0" smtClean="0">
+                <a:latin typeface="Calibri" panose="020F0502020204030204" pitchFamily="34" charset="0"/>
+                <a:cs typeface="Courier New" panose="02070309020205020404" pitchFamily="49" charset="0"/>
+              </a:rPr>
+              <a:t>sur l’objet </a:t>
+            </a:r>
+            <a:r>
+              <a:rPr lang="fr-FR" sz="5400" dirty="0" smtClean="0">
+                <a:solidFill>
+                  <a:srgbClr val="00B050"/>
+                </a:solidFill>
+                <a:latin typeface="Courier New" panose="02070309020205020404" pitchFamily="49" charset="0"/>
+                <a:cs typeface="Courier New" panose="02070309020205020404" pitchFamily="49" charset="0"/>
+              </a:rPr>
+              <a:t>type</a:t>
+            </a:r>
+          </a:p>
+          <a:p>
+            <a:pPr lvl="1"/>
+            <a:endParaRPr lang="fr-FR" sz="5400" dirty="0">
+              <a:solidFill>
+                <a:srgbClr val="00B050"/>
+              </a:solidFill>
               <a:latin typeface="Courier New" panose="02070309020205020404" pitchFamily="49" charset="0"/>
               <a:cs typeface="Courier New" panose="02070309020205020404" pitchFamily="49" charset="0"/>
             </a:endParaRPr>
           </a:p>
+          <a:p>
+            <a:r>
+              <a:rPr lang="en-US" sz="3200" dirty="0" err="1">
+                <a:latin typeface="Courier New" panose="02070309020205020404" pitchFamily="49" charset="0"/>
+                <a:cs typeface="Courier New" panose="02070309020205020404" pitchFamily="49" charset="0"/>
+              </a:rPr>
+              <a:t>cls</a:t>
+            </a:r>
+            <a:r>
+              <a:rPr lang="en-US" sz="3200" dirty="0">
+                <a:latin typeface="Courier New" panose="02070309020205020404" pitchFamily="49" charset="0"/>
+                <a:cs typeface="Courier New" panose="02070309020205020404" pitchFamily="49" charset="0"/>
+              </a:rPr>
+              <a:t> = </a:t>
+            </a:r>
+            <a:r>
+              <a:rPr lang="en-US" sz="3200" dirty="0" err="1" smtClean="0">
+                <a:latin typeface="Courier New" panose="02070309020205020404" pitchFamily="49" charset="0"/>
+                <a:cs typeface="Courier New" panose="02070309020205020404" pitchFamily="49" charset="0"/>
+              </a:rPr>
+              <a:t>type.__</a:t>
+            </a:r>
+            <a:r>
+              <a:rPr lang="en-US" sz="3200" dirty="0" err="1">
+                <a:latin typeface="Courier New" panose="02070309020205020404" pitchFamily="49" charset="0"/>
+                <a:cs typeface="Courier New" panose="02070309020205020404" pitchFamily="49" charset="0"/>
+              </a:rPr>
+              <a:t>new</a:t>
+            </a:r>
+            <a:r>
+              <a:rPr lang="en-US" sz="3200" dirty="0" smtClean="0">
+                <a:latin typeface="Courier New" panose="02070309020205020404" pitchFamily="49" charset="0"/>
+                <a:cs typeface="Courier New" panose="02070309020205020404" pitchFamily="49" charset="0"/>
+              </a:rPr>
+              <a:t>__(type, </a:t>
+            </a:r>
+            <a:r>
+              <a:rPr lang="en-US" sz="3200" dirty="0">
+                <a:latin typeface="Courier New" panose="02070309020205020404" pitchFamily="49" charset="0"/>
+                <a:cs typeface="Courier New" panose="02070309020205020404" pitchFamily="49" charset="0"/>
+              </a:rPr>
+              <a:t>name, bases, </a:t>
+            </a:r>
+            <a:r>
+              <a:rPr lang="en-US" sz="3200" dirty="0" err="1">
+                <a:latin typeface="Courier New" panose="02070309020205020404" pitchFamily="49" charset="0"/>
+                <a:cs typeface="Courier New" panose="02070309020205020404" pitchFamily="49" charset="0"/>
+              </a:rPr>
+              <a:t>dict</a:t>
+            </a:r>
+            <a:r>
+              <a:rPr lang="en-US" sz="3200" dirty="0">
+                <a:latin typeface="Courier New" panose="02070309020205020404" pitchFamily="49" charset="0"/>
+                <a:cs typeface="Courier New" panose="02070309020205020404" pitchFamily="49" charset="0"/>
+              </a:rPr>
+              <a:t>)</a:t>
+            </a:r>
+          </a:p>
+          <a:p>
+            <a:r>
+              <a:rPr lang="en-US" sz="3200" dirty="0" smtClean="0">
+                <a:latin typeface="Courier New" panose="02070309020205020404" pitchFamily="49" charset="0"/>
+                <a:cs typeface="Courier New" panose="02070309020205020404" pitchFamily="49" charset="0"/>
+              </a:rPr>
+              <a:t>type.__</a:t>
+            </a:r>
+            <a:r>
+              <a:rPr lang="en-US" sz="3200" dirty="0" err="1">
+                <a:latin typeface="Courier New" panose="02070309020205020404" pitchFamily="49" charset="0"/>
+                <a:cs typeface="Courier New" panose="02070309020205020404" pitchFamily="49" charset="0"/>
+              </a:rPr>
+              <a:t>init</a:t>
+            </a:r>
+            <a:r>
+              <a:rPr lang="en-US" sz="3200" dirty="0">
+                <a:latin typeface="Courier New" panose="02070309020205020404" pitchFamily="49" charset="0"/>
+                <a:cs typeface="Courier New" panose="02070309020205020404" pitchFamily="49" charset="0"/>
+              </a:rPr>
+              <a:t>__(</a:t>
+            </a:r>
+            <a:r>
+              <a:rPr lang="en-US" sz="3200" dirty="0" err="1">
+                <a:latin typeface="Courier New" panose="02070309020205020404" pitchFamily="49" charset="0"/>
+                <a:cs typeface="Courier New" panose="02070309020205020404" pitchFamily="49" charset="0"/>
+              </a:rPr>
+              <a:t>cls</a:t>
+            </a:r>
+            <a:r>
+              <a:rPr lang="en-US" sz="3200" dirty="0">
+                <a:latin typeface="Courier New" panose="02070309020205020404" pitchFamily="49" charset="0"/>
+                <a:cs typeface="Courier New" panose="02070309020205020404" pitchFamily="49" charset="0"/>
+              </a:rPr>
+              <a:t>, name, bases, </a:t>
+            </a:r>
+            <a:r>
+              <a:rPr lang="en-US" sz="3200" dirty="0" err="1">
+                <a:latin typeface="Courier New" panose="02070309020205020404" pitchFamily="49" charset="0"/>
+                <a:cs typeface="Courier New" panose="02070309020205020404" pitchFamily="49" charset="0"/>
+              </a:rPr>
+              <a:t>dict</a:t>
+            </a:r>
+            <a:r>
+              <a:rPr lang="en-US" sz="3200" dirty="0">
+                <a:latin typeface="Courier New" panose="02070309020205020404" pitchFamily="49" charset="0"/>
+                <a:cs typeface="Courier New" panose="02070309020205020404" pitchFamily="49" charset="0"/>
+              </a:rPr>
+              <a:t>)</a:t>
+            </a:r>
+            <a:endParaRPr lang="fr-FR" sz="3200" dirty="0" smtClean="0">
+              <a:latin typeface="Courier New" panose="02070309020205020404" pitchFamily="49" charset="0"/>
+              <a:cs typeface="Courier New" panose="02070309020205020404" pitchFamily="49" charset="0"/>
+            </a:endParaRPr>
+          </a:p>
         </p:txBody>
       </p:sp>
     </p:spTree>
     <p:extLst>
       <p:ext uri="{BB962C8B-B14F-4D97-AF65-F5344CB8AC3E}">
-        <p14:creationId xmlns:p14="http://schemas.microsoft.com/office/powerpoint/2010/main" val="764096279"/>
+        <p14:creationId xmlns:p14="http://schemas.microsoft.com/office/powerpoint/2010/main" val="1807560953"/>
       </p:ext>
     </p:extLst>
   </p:cSld>
@@ -12132,6 +13351,150 @@
       </p:grpSpPr>
       <p:sp>
         <p:nvSpPr>
+          <p:cNvPr id="5" name="ZoneTexte 4"/>
+          <p:cNvSpPr txBox="1"/>
+          <p:nvPr/>
+        </p:nvSpPr>
+        <p:spPr>
+          <a:xfrm>
+            <a:off x="401443" y="572766"/>
+            <a:ext cx="11790557" cy="3600986"/>
+          </a:xfrm>
+          <a:prstGeom prst="rect">
+            <a:avLst/>
+          </a:prstGeom>
+          <a:noFill/>
+        </p:spPr>
+        <p:txBody>
+          <a:bodyPr wrap="square" rtlCol="0">
+            <a:spAutoFit/>
+          </a:bodyPr>
+          <a:lstStyle/>
+          <a:p>
+            <a:r>
+              <a:rPr lang="fr-FR" sz="4800" dirty="0" smtClean="0">
+                <a:latin typeface="Courier New" panose="02070309020205020404" pitchFamily="49" charset="0"/>
+                <a:cs typeface="Courier New" panose="02070309020205020404" pitchFamily="49" charset="0"/>
+              </a:rPr>
+              <a:t>__new__ </a:t>
+            </a:r>
+            <a:r>
+              <a:rPr lang="fr-FR" sz="4800" dirty="0">
+                <a:latin typeface="Calibri" panose="020F0502020204030204" pitchFamily="34" charset="0"/>
+                <a:cs typeface="Courier New" panose="02070309020205020404" pitchFamily="49" charset="0"/>
+              </a:rPr>
+              <a:t>crée l’objet classe</a:t>
+            </a:r>
+            <a:endParaRPr lang="fr-FR" sz="4800" dirty="0" smtClean="0">
+              <a:latin typeface="Calibri" panose="020F0502020204030204" pitchFamily="34" charset="0"/>
+              <a:cs typeface="Courier New" panose="02070309020205020404" pitchFamily="49" charset="0"/>
+            </a:endParaRPr>
+          </a:p>
+          <a:p>
+            <a:pPr marL="1314450" lvl="1" indent="-857250">
+              <a:buFont typeface="Arial" panose="020B0604020202020204" pitchFamily="34" charset="0"/>
+              <a:buChar char="•"/>
+            </a:pPr>
+            <a:r>
+              <a:rPr lang="fr-FR" sz="4400" dirty="0" smtClean="0">
+                <a:latin typeface="Calibri" panose="020F0502020204030204" pitchFamily="34" charset="0"/>
+                <a:cs typeface="Courier New" panose="02070309020205020404" pitchFamily="49" charset="0"/>
+              </a:rPr>
+              <a:t>Utile pour modifier l’espace de nommage ou les superclasses avant la création de la classe</a:t>
+            </a:r>
+          </a:p>
+          <a:p>
+            <a:r>
+              <a:rPr lang="fr-FR" sz="4800" dirty="0" smtClean="0">
+                <a:latin typeface="Courier New" panose="02070309020205020404" pitchFamily="49" charset="0"/>
+                <a:cs typeface="Courier New" panose="02070309020205020404" pitchFamily="49" charset="0"/>
+              </a:rPr>
+              <a:t>__</a:t>
+            </a:r>
+            <a:r>
+              <a:rPr lang="fr-FR" sz="4800" dirty="0" err="1" smtClean="0">
+                <a:latin typeface="Courier New" panose="02070309020205020404" pitchFamily="49" charset="0"/>
+                <a:cs typeface="Courier New" panose="02070309020205020404" pitchFamily="49" charset="0"/>
+              </a:rPr>
+              <a:t>init</a:t>
+            </a:r>
+            <a:r>
+              <a:rPr lang="fr-FR" sz="4800" dirty="0" smtClean="0">
+                <a:latin typeface="Courier New" panose="02070309020205020404" pitchFamily="49" charset="0"/>
+                <a:cs typeface="Courier New" panose="02070309020205020404" pitchFamily="49" charset="0"/>
+              </a:rPr>
+              <a:t>__ </a:t>
+            </a:r>
+            <a:r>
+              <a:rPr lang="fr-FR" sz="4800" dirty="0">
+                <a:latin typeface="Calibri" panose="020F0502020204030204" pitchFamily="34" charset="0"/>
+                <a:cs typeface="Courier New" panose="02070309020205020404" pitchFamily="49" charset="0"/>
+              </a:rPr>
+              <a:t>initialise l’objet classe</a:t>
+            </a:r>
+            <a:endParaRPr lang="fr-FR" sz="4800" dirty="0" smtClean="0">
+              <a:latin typeface="Calibri" panose="020F0502020204030204" pitchFamily="34" charset="0"/>
+              <a:cs typeface="Courier New" panose="02070309020205020404" pitchFamily="49" charset="0"/>
+            </a:endParaRPr>
+          </a:p>
+          <a:p>
+            <a:pPr marL="1143000" lvl="1" indent="-685800">
+              <a:buFont typeface="Arial" panose="020B0604020202020204" pitchFamily="34" charset="0"/>
+              <a:buChar char="•"/>
+            </a:pPr>
+            <a:r>
+              <a:rPr lang="fr-FR" sz="4400" dirty="0" smtClean="0">
+                <a:latin typeface="Calibri" panose="020F0502020204030204" pitchFamily="34" charset="0"/>
+                <a:cs typeface="Courier New" panose="02070309020205020404" pitchFamily="49" charset="0"/>
+              </a:rPr>
+              <a:t>Utile pour modifier la classe après sa création</a:t>
+            </a:r>
+            <a:endParaRPr lang="fr-FR" sz="4400" dirty="0" smtClean="0">
+              <a:latin typeface="Courier New" panose="02070309020205020404" pitchFamily="49" charset="0"/>
+              <a:cs typeface="Courier New" panose="02070309020205020404" pitchFamily="49" charset="0"/>
+            </a:endParaRPr>
+          </a:p>
+        </p:txBody>
+      </p:sp>
+    </p:spTree>
+    <p:extLst>
+      <p:ext uri="{BB962C8B-B14F-4D97-AF65-F5344CB8AC3E}">
+        <p14:creationId xmlns:p14="http://schemas.microsoft.com/office/powerpoint/2010/main" val="764096279"/>
+      </p:ext>
+    </p:extLst>
+  </p:cSld>
+  <p:clrMapOvr>
+    <a:masterClrMapping/>
+  </p:clrMapOvr>
+  <p:timing>
+    <p:tnLst>
+      <p:par>
+        <p:cTn id="1" dur="indefinite" restart="never" nodeType="tmRoot"/>
+      </p:par>
+    </p:tnLst>
+  </p:timing>
+</p:sld>
+</file>
+
+<file path=ppt/slides/slide24.xml><?xml version="1.0" encoding="utf-8"?>
+<p:sld xmlns:a="http://schemas.openxmlformats.org/drawingml/2006/main" xmlns:r="http://schemas.openxmlformats.org/officeDocument/2006/relationships" xmlns:p="http://schemas.openxmlformats.org/presentationml/2006/main">
+  <p:cSld>
+    <p:spTree>
+      <p:nvGrpSpPr>
+        <p:cNvPr id="1" name=""/>
+        <p:cNvGrpSpPr/>
+        <p:nvPr/>
+      </p:nvGrpSpPr>
+      <p:grpSpPr>
+        <a:xfrm>
+          <a:off x="0" y="0"/>
+          <a:ext cx="0" cy="0"/>
+          <a:chOff x="0" y="0"/>
+          <a:chExt cx="0" cy="0"/>
+        </a:xfrm>
+      </p:grpSpPr>
+      <p:sp>
+        <p:nvSpPr>
           <p:cNvPr id="2" name="ZoneTexte 1"/>
           <p:cNvSpPr txBox="1"/>
           <p:nvPr/>
@@ -12683,10 +14046,6 @@
               </a:rPr>
               <a:t>"</a:t>
             </a:r>
-            <a:endParaRPr lang="en-US" dirty="0">
-              <a:latin typeface="Courier New" panose="02070309020205020404" pitchFamily="49" charset="0"/>
-              <a:cs typeface="Courier New" panose="02070309020205020404" pitchFamily="49" charset="0"/>
-            </a:endParaRPr>
           </a:p>
         </p:txBody>
       </p:sp>
@@ -12781,7 +14140,7 @@
 </p:sld>
 </file>
 
-<file path=ppt/slides/slide24.xml><?xml version="1.0" encoding="utf-8"?>
+<file path=ppt/slides/slide25.xml><?xml version="1.0" encoding="utf-8"?>
 <p:sld xmlns:a="http://schemas.openxmlformats.org/drawingml/2006/main" xmlns:r="http://schemas.openxmlformats.org/officeDocument/2006/relationships" xmlns:p="http://schemas.openxmlformats.org/presentationml/2006/main">
   <p:cSld>
     <p:spTree>
@@ -13009,6 +14368,1396 @@
     <p:bldLst>
       <p:bldP spid="2" grpId="0"/>
     </p:bldLst>
+  </p:timing>
+</p:sld>
+</file>
+
+<file path=ppt/slides/slide26.xml><?xml version="1.0" encoding="utf-8"?>
+<p:sld xmlns:a="http://schemas.openxmlformats.org/drawingml/2006/main" xmlns:r="http://schemas.openxmlformats.org/officeDocument/2006/relationships" xmlns:p="http://schemas.openxmlformats.org/presentationml/2006/main">
+  <p:cSld>
+    <p:spTree>
+      <p:nvGrpSpPr>
+        <p:cNvPr id="1" name=""/>
+        <p:cNvGrpSpPr/>
+        <p:nvPr/>
+      </p:nvGrpSpPr>
+      <p:grpSpPr>
+        <a:xfrm>
+          <a:off x="0" y="0"/>
+          <a:ext cx="0" cy="0"/>
+          <a:chOff x="0" y="0"/>
+          <a:chExt cx="0" cy="0"/>
+        </a:xfrm>
+      </p:grpSpPr>
+      <p:sp>
+        <p:nvSpPr>
+          <p:cNvPr id="7" name="ZoneTexte 6"/>
+          <p:cNvSpPr txBox="1"/>
+          <p:nvPr/>
+        </p:nvSpPr>
+        <p:spPr>
+          <a:xfrm>
+            <a:off x="4174065" y="4056554"/>
+            <a:ext cx="2031999" cy="769441"/>
+          </a:xfrm>
+          <a:prstGeom prst="rect">
+            <a:avLst/>
+          </a:prstGeom>
+          <a:noFill/>
+          <a:ln w="50800">
+            <a:solidFill>
+              <a:schemeClr val="tx1"/>
+            </a:solidFill>
+          </a:ln>
+        </p:spPr>
+        <p:txBody>
+          <a:bodyPr wrap="square" rtlCol="0">
+            <a:spAutoFit/>
+          </a:bodyPr>
+          <a:lstStyle/>
+          <a:p>
+            <a:pPr algn="ctr"/>
+            <a:r>
+              <a:rPr lang="fr-FR" sz="4400" dirty="0" smtClean="0">
+                <a:latin typeface="Calibri" panose="020F0502020204030204" pitchFamily="34" charset="0"/>
+                <a:cs typeface="Calibri" panose="020F0502020204030204" pitchFamily="34" charset="0"/>
+              </a:rPr>
+              <a:t>class C</a:t>
+            </a:r>
+            <a:endParaRPr lang="fr-FR" sz="4400" dirty="0">
+              <a:latin typeface="Calibri" panose="020F0502020204030204" pitchFamily="34" charset="0"/>
+              <a:cs typeface="Calibri" panose="020F0502020204030204" pitchFamily="34" charset="0"/>
+            </a:endParaRPr>
+          </a:p>
+        </p:txBody>
+      </p:sp>
+      <p:sp>
+        <p:nvSpPr>
+          <p:cNvPr id="9" name="ZoneTexte 8"/>
+          <p:cNvSpPr txBox="1"/>
+          <p:nvPr/>
+        </p:nvSpPr>
+        <p:spPr>
+          <a:xfrm>
+            <a:off x="86416" y="2399135"/>
+            <a:ext cx="3400093" cy="769441"/>
+          </a:xfrm>
+          <a:prstGeom prst="rect">
+            <a:avLst/>
+          </a:prstGeom>
+          <a:noFill/>
+          <a:ln w="50800">
+            <a:solidFill>
+              <a:schemeClr val="tx1"/>
+            </a:solidFill>
+          </a:ln>
+        </p:spPr>
+        <p:txBody>
+          <a:bodyPr wrap="square" rtlCol="0">
+            <a:spAutoFit/>
+          </a:bodyPr>
+          <a:lstStyle/>
+          <a:p>
+            <a:pPr algn="ctr"/>
+            <a:r>
+              <a:rPr lang="fr-FR" sz="4400" dirty="0" err="1" smtClean="0">
+                <a:latin typeface="Calibri" panose="020F0502020204030204" pitchFamily="34" charset="0"/>
+                <a:cs typeface="Calibri" panose="020F0502020204030204" pitchFamily="34" charset="0"/>
+              </a:rPr>
+              <a:t>metaclass</a:t>
+            </a:r>
+            <a:r>
+              <a:rPr lang="fr-FR" sz="4400" dirty="0" smtClean="0">
+                <a:latin typeface="Calibri" panose="020F0502020204030204" pitchFamily="34" charset="0"/>
+                <a:cs typeface="Calibri" panose="020F0502020204030204" pitchFamily="34" charset="0"/>
+              </a:rPr>
+              <a:t> M</a:t>
+            </a:r>
+            <a:endParaRPr lang="fr-FR" sz="4400" dirty="0">
+              <a:latin typeface="Calibri" panose="020F0502020204030204" pitchFamily="34" charset="0"/>
+              <a:cs typeface="Calibri" panose="020F0502020204030204" pitchFamily="34" charset="0"/>
+            </a:endParaRPr>
+          </a:p>
+        </p:txBody>
+      </p:sp>
+      <p:sp>
+        <p:nvSpPr>
+          <p:cNvPr id="10" name="ZoneTexte 9"/>
+          <p:cNvSpPr txBox="1"/>
+          <p:nvPr/>
+        </p:nvSpPr>
+        <p:spPr>
+          <a:xfrm>
+            <a:off x="4174066" y="737621"/>
+            <a:ext cx="2031999" cy="769441"/>
+          </a:xfrm>
+          <a:prstGeom prst="rect">
+            <a:avLst/>
+          </a:prstGeom>
+          <a:noFill/>
+          <a:ln w="50800">
+            <a:solidFill>
+              <a:schemeClr val="tx1"/>
+            </a:solidFill>
+          </a:ln>
+        </p:spPr>
+        <p:txBody>
+          <a:bodyPr wrap="square" rtlCol="0">
+            <a:spAutoFit/>
+          </a:bodyPr>
+          <a:lstStyle/>
+          <a:p>
+            <a:pPr algn="ctr"/>
+            <a:r>
+              <a:rPr lang="fr-FR" sz="4400" dirty="0" err="1" smtClean="0">
+                <a:latin typeface="Calibri" panose="020F0502020204030204" pitchFamily="34" charset="0"/>
+                <a:cs typeface="Calibri" panose="020F0502020204030204" pitchFamily="34" charset="0"/>
+              </a:rPr>
+              <a:t>object</a:t>
+            </a:r>
+            <a:endParaRPr lang="fr-FR" sz="4400" dirty="0">
+              <a:latin typeface="Calibri" panose="020F0502020204030204" pitchFamily="34" charset="0"/>
+              <a:cs typeface="Calibri" panose="020F0502020204030204" pitchFamily="34" charset="0"/>
+            </a:endParaRPr>
+          </a:p>
+        </p:txBody>
+      </p:sp>
+      <p:sp>
+        <p:nvSpPr>
+          <p:cNvPr id="11" name="ZoneTexte 10"/>
+          <p:cNvSpPr txBox="1"/>
+          <p:nvPr/>
+        </p:nvSpPr>
+        <p:spPr>
+          <a:xfrm>
+            <a:off x="3352796" y="5716020"/>
+            <a:ext cx="3674536" cy="769441"/>
+          </a:xfrm>
+          <a:prstGeom prst="rect">
+            <a:avLst/>
+          </a:prstGeom>
+          <a:noFill/>
+          <a:ln w="50800">
+            <a:solidFill>
+              <a:schemeClr val="tx1"/>
+            </a:solidFill>
+          </a:ln>
+        </p:spPr>
+        <p:txBody>
+          <a:bodyPr wrap="square" rtlCol="0">
+            <a:spAutoFit/>
+          </a:bodyPr>
+          <a:lstStyle/>
+          <a:p>
+            <a:pPr algn="ctr"/>
+            <a:r>
+              <a:rPr lang="fr-FR" sz="4400" dirty="0">
+                <a:latin typeface="Calibri" panose="020F0502020204030204" pitchFamily="34" charset="0"/>
+                <a:cs typeface="Calibri" panose="020F0502020204030204" pitchFamily="34" charset="0"/>
+              </a:rPr>
+              <a:t>i</a:t>
+            </a:r>
+            <a:r>
+              <a:rPr lang="fr-FR" sz="4400" dirty="0" smtClean="0">
+                <a:latin typeface="Calibri" panose="020F0502020204030204" pitchFamily="34" charset="0"/>
+                <a:cs typeface="Calibri" panose="020F0502020204030204" pitchFamily="34" charset="0"/>
+              </a:rPr>
+              <a:t>nstance de C</a:t>
+            </a:r>
+            <a:endParaRPr lang="fr-FR" sz="4400" dirty="0">
+              <a:latin typeface="Calibri" panose="020F0502020204030204" pitchFamily="34" charset="0"/>
+              <a:cs typeface="Calibri" panose="020F0502020204030204" pitchFamily="34" charset="0"/>
+            </a:endParaRPr>
+          </a:p>
+        </p:txBody>
+      </p:sp>
+      <p:sp>
+        <p:nvSpPr>
+          <p:cNvPr id="12" name="ZoneTexte 11"/>
+          <p:cNvSpPr txBox="1"/>
+          <p:nvPr/>
+        </p:nvSpPr>
+        <p:spPr>
+          <a:xfrm>
+            <a:off x="770463" y="730175"/>
+            <a:ext cx="2031999" cy="769441"/>
+          </a:xfrm>
+          <a:prstGeom prst="rect">
+            <a:avLst/>
+          </a:prstGeom>
+          <a:noFill/>
+          <a:ln w="50800">
+            <a:solidFill>
+              <a:schemeClr val="tx1"/>
+            </a:solidFill>
+          </a:ln>
+        </p:spPr>
+        <p:txBody>
+          <a:bodyPr wrap="square" rtlCol="0">
+            <a:spAutoFit/>
+          </a:bodyPr>
+          <a:lstStyle/>
+          <a:p>
+            <a:pPr algn="ctr"/>
+            <a:r>
+              <a:rPr lang="fr-FR" sz="4400" dirty="0" smtClean="0">
+                <a:latin typeface="Calibri" panose="020F0502020204030204" pitchFamily="34" charset="0"/>
+                <a:cs typeface="Calibri" panose="020F0502020204030204" pitchFamily="34" charset="0"/>
+              </a:rPr>
+              <a:t>type</a:t>
+            </a:r>
+            <a:endParaRPr lang="fr-FR" sz="4400" dirty="0">
+              <a:latin typeface="Calibri" panose="020F0502020204030204" pitchFamily="34" charset="0"/>
+              <a:cs typeface="Calibri" panose="020F0502020204030204" pitchFamily="34" charset="0"/>
+            </a:endParaRPr>
+          </a:p>
+        </p:txBody>
+      </p:sp>
+      <p:cxnSp>
+        <p:nvCxnSpPr>
+          <p:cNvPr id="14" name="Connecteur droit avec flèche 13"/>
+          <p:cNvCxnSpPr>
+            <a:stCxn id="11" idx="0"/>
+            <a:endCxn id="7" idx="2"/>
+          </p:cNvCxnSpPr>
+          <p:nvPr/>
+        </p:nvCxnSpPr>
+        <p:spPr bwMode="auto">
+          <a:xfrm flipV="1">
+            <a:off x="5190064" y="4825995"/>
+            <a:ext cx="1" cy="890025"/>
+          </a:xfrm>
+          <a:prstGeom prst="straightConnector1">
+            <a:avLst/>
+          </a:prstGeom>
+          <a:noFill/>
+          <a:ln w="38100" cap="flat" cmpd="sng" algn="ctr">
+            <a:solidFill>
+              <a:srgbClr val="00B050"/>
+            </a:solidFill>
+            <a:prstDash val="solid"/>
+            <a:round/>
+            <a:headEnd type="none" w="med" len="med"/>
+            <a:tailEnd type="triangle" w="lg" len="lg"/>
+          </a:ln>
+          <a:effectLst/>
+        </p:spPr>
+      </p:cxnSp>
+      <p:cxnSp>
+        <p:nvCxnSpPr>
+          <p:cNvPr id="21" name="Connecteur droit avec flèche 20"/>
+          <p:cNvCxnSpPr/>
+          <p:nvPr/>
+        </p:nvCxnSpPr>
+        <p:spPr bwMode="auto">
+          <a:xfrm flipH="1" flipV="1">
+            <a:off x="2802462" y="1271013"/>
+            <a:ext cx="1371604" cy="7446"/>
+          </a:xfrm>
+          <a:prstGeom prst="straightConnector1">
+            <a:avLst/>
+          </a:prstGeom>
+          <a:noFill/>
+          <a:ln w="38100" cap="flat" cmpd="sng" algn="ctr">
+            <a:solidFill>
+              <a:srgbClr val="00B050"/>
+            </a:solidFill>
+            <a:prstDash val="solid"/>
+            <a:round/>
+            <a:headEnd type="none" w="med" len="med"/>
+            <a:tailEnd type="triangle" w="lg" len="lg"/>
+          </a:ln>
+          <a:effectLst/>
+        </p:spPr>
+      </p:cxnSp>
+      <p:sp>
+        <p:nvSpPr>
+          <p:cNvPr id="22" name="Forme libre 21"/>
+          <p:cNvSpPr/>
+          <p:nvPr/>
+        </p:nvSpPr>
+        <p:spPr bwMode="auto">
+          <a:xfrm>
+            <a:off x="215201" y="215106"/>
+            <a:ext cx="1838853" cy="866562"/>
+          </a:xfrm>
+          <a:custGeom>
+            <a:avLst/>
+            <a:gdLst>
+              <a:gd name="connsiteX0" fmla="*/ 565384 w 1838853"/>
+              <a:gd name="connsiteY0" fmla="*/ 866562 h 866562"/>
+              <a:gd name="connsiteX1" fmla="*/ 52428 w 1838853"/>
+              <a:gd name="connsiteY1" fmla="*/ 141733 h 866562"/>
+              <a:gd name="connsiteX2" fmla="*/ 1691658 w 1838853"/>
+              <a:gd name="connsiteY2" fmla="*/ 30221 h 866562"/>
+              <a:gd name="connsiteX3" fmla="*/ 1658204 w 1838853"/>
+              <a:gd name="connsiteY3" fmla="*/ 520874 h 866562"/>
+            </a:gdLst>
+            <a:ahLst/>
+            <a:cxnLst>
+              <a:cxn ang="0">
+                <a:pos x="connsiteX0" y="connsiteY0"/>
+              </a:cxn>
+              <a:cxn ang="0">
+                <a:pos x="connsiteX1" y="connsiteY1"/>
+              </a:cxn>
+              <a:cxn ang="0">
+                <a:pos x="connsiteX2" y="connsiteY2"/>
+              </a:cxn>
+              <a:cxn ang="0">
+                <a:pos x="connsiteX3" y="connsiteY3"/>
+              </a:cxn>
+            </a:cxnLst>
+            <a:rect l="l" t="t" r="r" b="b"/>
+            <a:pathLst>
+              <a:path w="1838853" h="866562">
+                <a:moveTo>
+                  <a:pt x="565384" y="866562"/>
+                </a:moveTo>
+                <a:cubicBezTo>
+                  <a:pt x="215050" y="573842"/>
+                  <a:pt x="-135284" y="281123"/>
+                  <a:pt x="52428" y="141733"/>
+                </a:cubicBezTo>
+                <a:cubicBezTo>
+                  <a:pt x="240140" y="2343"/>
+                  <a:pt x="1424029" y="-32969"/>
+                  <a:pt x="1691658" y="30221"/>
+                </a:cubicBezTo>
+                <a:cubicBezTo>
+                  <a:pt x="1959287" y="93411"/>
+                  <a:pt x="1808745" y="307142"/>
+                  <a:pt x="1658204" y="520874"/>
+                </a:cubicBezTo>
+              </a:path>
+            </a:pathLst>
+          </a:custGeom>
+          <a:noFill/>
+          <a:ln w="38100" cap="flat" cmpd="sng" algn="ctr">
+            <a:solidFill>
+              <a:srgbClr val="00B050"/>
+            </a:solidFill>
+            <a:prstDash val="solid"/>
+            <a:round/>
+            <a:headEnd type="none" w="med" len="med"/>
+            <a:tailEnd type="triangle" w="lg" len="lg"/>
+          </a:ln>
+          <a:effectLst/>
+        </p:spPr>
+        <p:txBody>
+          <a:bodyPr rtlCol="0" anchor="ctr"/>
+          <a:lstStyle/>
+          <a:p>
+            <a:pPr algn="ctr"/>
+            <a:endParaRPr lang="fr-FR"/>
+          </a:p>
+        </p:txBody>
+      </p:sp>
+      <p:cxnSp>
+        <p:nvCxnSpPr>
+          <p:cNvPr id="24" name="Connecteur droit avec flèche 23"/>
+          <p:cNvCxnSpPr>
+            <a:stCxn id="7" idx="0"/>
+            <a:endCxn id="10" idx="2"/>
+          </p:cNvCxnSpPr>
+          <p:nvPr/>
+        </p:nvCxnSpPr>
+        <p:spPr bwMode="auto">
+          <a:xfrm flipV="1">
+            <a:off x="5190065" y="1507062"/>
+            <a:ext cx="1" cy="2549492"/>
+          </a:xfrm>
+          <a:prstGeom prst="straightConnector1">
+            <a:avLst/>
+          </a:prstGeom>
+          <a:noFill/>
+          <a:ln w="38100" cap="flat" cmpd="sng" algn="ctr">
+            <a:solidFill>
+              <a:srgbClr val="FF0000"/>
+            </a:solidFill>
+            <a:prstDash val="solid"/>
+            <a:round/>
+            <a:headEnd type="none" w="med" len="med"/>
+            <a:tailEnd type="triangle" w="lg" len="lg"/>
+          </a:ln>
+          <a:effectLst/>
+        </p:spPr>
+      </p:cxnSp>
+      <p:cxnSp>
+        <p:nvCxnSpPr>
+          <p:cNvPr id="28" name="Connecteur droit avec flèche 27"/>
+          <p:cNvCxnSpPr/>
+          <p:nvPr/>
+        </p:nvCxnSpPr>
+        <p:spPr bwMode="auto">
+          <a:xfrm>
+            <a:off x="2802462" y="959005"/>
+            <a:ext cx="1368094" cy="11151"/>
+          </a:xfrm>
+          <a:prstGeom prst="straightConnector1">
+            <a:avLst/>
+          </a:prstGeom>
+          <a:noFill/>
+          <a:ln w="38100" cap="flat" cmpd="sng" algn="ctr">
+            <a:solidFill>
+              <a:srgbClr val="FF0000"/>
+            </a:solidFill>
+            <a:prstDash val="solid"/>
+            <a:round/>
+            <a:headEnd type="none" w="med" len="med"/>
+            <a:tailEnd type="triangle" w="lg" len="lg"/>
+          </a:ln>
+          <a:effectLst/>
+        </p:spPr>
+      </p:cxnSp>
+      <p:grpSp>
+        <p:nvGrpSpPr>
+          <p:cNvPr id="40" name="Groupe 39"/>
+          <p:cNvGrpSpPr/>
+          <p:nvPr/>
+        </p:nvGrpSpPr>
+        <p:grpSpPr>
+          <a:xfrm>
+            <a:off x="-5600" y="5111834"/>
+            <a:ext cx="2808062" cy="1540459"/>
+            <a:chOff x="-79356" y="4560281"/>
+            <a:chExt cx="2808062" cy="1540459"/>
+          </a:xfrm>
+        </p:grpSpPr>
+        <p:cxnSp>
+          <p:nvCxnSpPr>
+            <p:cNvPr id="30" name="Connecteur droit avec flèche 29"/>
+            <p:cNvCxnSpPr/>
+            <p:nvPr/>
+          </p:nvCxnSpPr>
+          <p:spPr bwMode="auto">
+            <a:xfrm>
+              <a:off x="301084" y="5097940"/>
+              <a:ext cx="2118732" cy="0"/>
+            </a:xfrm>
+            <a:prstGeom prst="straightConnector1">
+              <a:avLst/>
+            </a:prstGeom>
+            <a:noFill/>
+            <a:ln w="38100" cap="flat" cmpd="sng" algn="ctr">
+              <a:solidFill>
+                <a:srgbClr val="00B050"/>
+              </a:solidFill>
+              <a:prstDash val="solid"/>
+              <a:round/>
+              <a:headEnd type="none" w="med" len="med"/>
+              <a:tailEnd type="triangle" w="lg" len="lg"/>
+            </a:ln>
+            <a:effectLst/>
+          </p:spPr>
+        </p:cxnSp>
+        <p:sp>
+          <p:nvSpPr>
+            <p:cNvPr id="31" name="ZoneTexte 30"/>
+            <p:cNvSpPr txBox="1"/>
+            <p:nvPr/>
+          </p:nvSpPr>
+          <p:spPr>
+            <a:xfrm>
+              <a:off x="-50219" y="4560281"/>
+              <a:ext cx="2778925" cy="523220"/>
+            </a:xfrm>
+            <a:prstGeom prst="rect">
+              <a:avLst/>
+            </a:prstGeom>
+            <a:noFill/>
+            <a:ln w="50800">
+              <a:noFill/>
+            </a:ln>
+          </p:spPr>
+          <p:txBody>
+            <a:bodyPr wrap="square" rtlCol="0">
+              <a:spAutoFit/>
+            </a:bodyPr>
+            <a:lstStyle/>
+            <a:p>
+              <a:pPr algn="ctr"/>
+              <a:r>
+                <a:rPr lang="fr-FR" sz="2800" dirty="0">
+                  <a:latin typeface="Calibri" panose="020F0502020204030204" pitchFamily="34" charset="0"/>
+                  <a:cs typeface="Calibri" panose="020F0502020204030204" pitchFamily="34" charset="0"/>
+                </a:rPr>
+                <a:t>i</a:t>
+              </a:r>
+              <a:r>
+                <a:rPr lang="fr-FR" sz="2800" dirty="0" smtClean="0">
+                  <a:latin typeface="Calibri" panose="020F0502020204030204" pitchFamily="34" charset="0"/>
+                  <a:cs typeface="Calibri" panose="020F0502020204030204" pitchFamily="34" charset="0"/>
+                </a:rPr>
+                <a:t>nstancié par</a:t>
+              </a:r>
+            </a:p>
+          </p:txBody>
+        </p:sp>
+        <p:cxnSp>
+          <p:nvCxnSpPr>
+            <p:cNvPr id="37" name="Connecteur droit avec flèche 36"/>
+            <p:cNvCxnSpPr/>
+            <p:nvPr/>
+          </p:nvCxnSpPr>
+          <p:spPr bwMode="auto">
+            <a:xfrm>
+              <a:off x="301084" y="5874808"/>
+              <a:ext cx="2118732" cy="0"/>
+            </a:xfrm>
+            <a:prstGeom prst="straightConnector1">
+              <a:avLst/>
+            </a:prstGeom>
+            <a:noFill/>
+            <a:ln w="38100" cap="flat" cmpd="sng" algn="ctr">
+              <a:solidFill>
+                <a:srgbClr val="FF0000"/>
+              </a:solidFill>
+              <a:prstDash val="solid"/>
+              <a:round/>
+              <a:headEnd type="none" w="med" len="med"/>
+              <a:tailEnd type="triangle" w="lg" len="lg"/>
+            </a:ln>
+            <a:effectLst/>
+          </p:spPr>
+        </p:cxnSp>
+        <p:sp>
+          <p:nvSpPr>
+            <p:cNvPr id="38" name="ZoneTexte 37"/>
+            <p:cNvSpPr txBox="1"/>
+            <p:nvPr/>
+          </p:nvSpPr>
+          <p:spPr>
+            <a:xfrm>
+              <a:off x="-79356" y="5328538"/>
+              <a:ext cx="2778925" cy="523220"/>
+            </a:xfrm>
+            <a:prstGeom prst="rect">
+              <a:avLst/>
+            </a:prstGeom>
+            <a:noFill/>
+            <a:ln w="50800">
+              <a:noFill/>
+            </a:ln>
+          </p:spPr>
+          <p:txBody>
+            <a:bodyPr wrap="square" rtlCol="0">
+              <a:spAutoFit/>
+            </a:bodyPr>
+            <a:lstStyle/>
+            <a:p>
+              <a:pPr algn="ctr"/>
+              <a:r>
+                <a:rPr lang="fr-FR" sz="2800" dirty="0" smtClean="0">
+                  <a:latin typeface="Calibri" panose="020F0502020204030204" pitchFamily="34" charset="0"/>
+                  <a:cs typeface="Calibri" panose="020F0502020204030204" pitchFamily="34" charset="0"/>
+                </a:rPr>
+                <a:t>hérite de</a:t>
+              </a:r>
+            </a:p>
+          </p:txBody>
+        </p:sp>
+        <p:sp>
+          <p:nvSpPr>
+            <p:cNvPr id="39" name="Rectangle à coins arrondis 38"/>
+            <p:cNvSpPr/>
+            <p:nvPr/>
+          </p:nvSpPr>
+          <p:spPr bwMode="auto">
+            <a:xfrm>
+              <a:off x="89210" y="4574720"/>
+              <a:ext cx="2499270" cy="1526020"/>
+            </a:xfrm>
+            <a:prstGeom prst="roundRect">
+              <a:avLst/>
+            </a:prstGeom>
+            <a:noFill/>
+            <a:ln w="38100" cap="flat" cmpd="sng" algn="ctr">
+              <a:solidFill>
+                <a:schemeClr val="tx1"/>
+              </a:solidFill>
+              <a:prstDash val="solid"/>
+              <a:round/>
+              <a:headEnd type="none" w="med" len="med"/>
+              <a:tailEnd type="triangle" w="lg" len="lg"/>
+            </a:ln>
+            <a:effectLst/>
+          </p:spPr>
+          <p:txBody>
+            <a:bodyPr rot="0" spcFirstLastPara="0" vertOverflow="overflow" horzOverflow="overflow" vert="horz" wrap="square" lIns="91440" tIns="45720" rIns="91440" bIns="45720" numCol="1" spcCol="0" rtlCol="0" fromWordArt="0" anchor="ctr" anchorCtr="0" forceAA="0" compatLnSpc="1">
+              <a:prstTxWarp prst="textNoShape">
+                <a:avLst/>
+              </a:prstTxWarp>
+              <a:noAutofit/>
+            </a:bodyPr>
+            <a:lstStyle/>
+            <a:p>
+              <a:pPr algn="ctr"/>
+              <a:endParaRPr lang="fr-FR"/>
+            </a:p>
+          </p:txBody>
+        </p:sp>
+      </p:grpSp>
+      <p:sp>
+        <p:nvSpPr>
+          <p:cNvPr id="4" name="Forme libre 3"/>
+          <p:cNvSpPr/>
+          <p:nvPr/>
+        </p:nvSpPr>
+        <p:spPr bwMode="auto">
+          <a:xfrm>
+            <a:off x="1693333" y="3166533"/>
+            <a:ext cx="2472267" cy="1270000"/>
+          </a:xfrm>
+          <a:custGeom>
+            <a:avLst/>
+            <a:gdLst>
+              <a:gd name="connsiteX0" fmla="*/ 2472267 w 2472267"/>
+              <a:gd name="connsiteY0" fmla="*/ 1270000 h 1270000"/>
+              <a:gd name="connsiteX1" fmla="*/ 1016000 w 2472267"/>
+              <a:gd name="connsiteY1" fmla="*/ 982134 h 1270000"/>
+              <a:gd name="connsiteX2" fmla="*/ 0 w 2472267"/>
+              <a:gd name="connsiteY2" fmla="*/ 0 h 1270000"/>
+            </a:gdLst>
+            <a:ahLst/>
+            <a:cxnLst>
+              <a:cxn ang="0">
+                <a:pos x="connsiteX0" y="connsiteY0"/>
+              </a:cxn>
+              <a:cxn ang="0">
+                <a:pos x="connsiteX1" y="connsiteY1"/>
+              </a:cxn>
+              <a:cxn ang="0">
+                <a:pos x="connsiteX2" y="connsiteY2"/>
+              </a:cxn>
+            </a:cxnLst>
+            <a:rect l="l" t="t" r="r" b="b"/>
+            <a:pathLst>
+              <a:path w="2472267" h="1270000">
+                <a:moveTo>
+                  <a:pt x="2472267" y="1270000"/>
+                </a:moveTo>
+                <a:cubicBezTo>
+                  <a:pt x="1950156" y="1231900"/>
+                  <a:pt x="1428045" y="1193801"/>
+                  <a:pt x="1016000" y="982134"/>
+                </a:cubicBezTo>
+                <a:cubicBezTo>
+                  <a:pt x="603955" y="770467"/>
+                  <a:pt x="301977" y="385233"/>
+                  <a:pt x="0" y="0"/>
+                </a:cubicBezTo>
+              </a:path>
+            </a:pathLst>
+          </a:custGeom>
+          <a:noFill/>
+          <a:ln w="38100" cap="flat" cmpd="sng" algn="ctr">
+            <a:solidFill>
+              <a:srgbClr val="00B050"/>
+            </a:solidFill>
+            <a:prstDash val="solid"/>
+            <a:round/>
+            <a:headEnd type="none" w="med" len="med"/>
+            <a:tailEnd type="triangle" w="lg" len="lg"/>
+          </a:ln>
+          <a:effectLst/>
+        </p:spPr>
+        <p:txBody>
+          <a:bodyPr rtlCol="0" anchor="ctr"/>
+          <a:lstStyle/>
+          <a:p>
+            <a:pPr algn="ctr"/>
+            <a:endParaRPr lang="fr-FR"/>
+          </a:p>
+        </p:txBody>
+      </p:sp>
+      <p:cxnSp>
+        <p:nvCxnSpPr>
+          <p:cNvPr id="13" name="Connecteur droit avec flèche 12"/>
+          <p:cNvCxnSpPr/>
+          <p:nvPr/>
+        </p:nvCxnSpPr>
+        <p:spPr bwMode="auto">
+          <a:xfrm flipV="1">
+            <a:off x="1134627" y="1507062"/>
+            <a:ext cx="0" cy="892073"/>
+          </a:xfrm>
+          <a:prstGeom prst="straightConnector1">
+            <a:avLst/>
+          </a:prstGeom>
+          <a:noFill/>
+          <a:ln w="38100" cap="flat" cmpd="sng" algn="ctr">
+            <a:solidFill>
+              <a:srgbClr val="00B050"/>
+            </a:solidFill>
+            <a:prstDash val="solid"/>
+            <a:round/>
+            <a:headEnd type="none" w="med" len="med"/>
+            <a:tailEnd type="triangle" w="lg" len="lg"/>
+          </a:ln>
+          <a:effectLst/>
+        </p:spPr>
+      </p:cxnSp>
+      <p:cxnSp>
+        <p:nvCxnSpPr>
+          <p:cNvPr id="20" name="Connecteur droit avec flèche 19"/>
+          <p:cNvCxnSpPr/>
+          <p:nvPr/>
+        </p:nvCxnSpPr>
+        <p:spPr bwMode="auto">
+          <a:xfrm flipH="1" flipV="1">
+            <a:off x="2319867" y="1507062"/>
+            <a:ext cx="16933" cy="892073"/>
+          </a:xfrm>
+          <a:prstGeom prst="straightConnector1">
+            <a:avLst/>
+          </a:prstGeom>
+          <a:noFill/>
+          <a:ln w="38100" cap="flat" cmpd="sng" algn="ctr">
+            <a:solidFill>
+              <a:srgbClr val="FF0000"/>
+            </a:solidFill>
+            <a:prstDash val="solid"/>
+            <a:round/>
+            <a:headEnd type="none" w="med" len="med"/>
+            <a:tailEnd type="triangle" w="lg" len="lg"/>
+          </a:ln>
+          <a:effectLst/>
+        </p:spPr>
+      </p:cxnSp>
+    </p:spTree>
+    <p:extLst>
+      <p:ext uri="{BB962C8B-B14F-4D97-AF65-F5344CB8AC3E}">
+        <p14:creationId xmlns:p14="http://schemas.microsoft.com/office/powerpoint/2010/main" val="317103356"/>
+      </p:ext>
+    </p:extLst>
+  </p:cSld>
+  <p:clrMapOvr>
+    <a:masterClrMapping/>
+  </p:clrMapOvr>
+  <p:timing>
+    <p:tnLst>
+      <p:par>
+        <p:cTn id="1" dur="indefinite" restart="never" nodeType="tmRoot">
+          <p:childTnLst>
+            <p:seq concurrent="1" nextAc="seek">
+              <p:cTn id="2" dur="indefinite" nodeType="mainSeq">
+                <p:childTnLst>
+                  <p:par>
+                    <p:cTn id="3" fill="hold">
+                      <p:stCondLst>
+                        <p:cond delay="indefinite"/>
+                      </p:stCondLst>
+                      <p:childTnLst>
+                        <p:par>
+                          <p:cTn id="4" fill="hold">
+                            <p:stCondLst>
+                              <p:cond delay="0"/>
+                            </p:stCondLst>
+                            <p:childTnLst>
+                              <p:par>
+                                <p:cTn id="5" presetID="10" presetClass="entr" presetSubtype="0" fill="hold" nodeType="clickEffect">
+                                  <p:stCondLst>
+                                    <p:cond delay="0"/>
+                                  </p:stCondLst>
+                                  <p:childTnLst>
+                                    <p:set>
+                                      <p:cBhvr>
+                                        <p:cTn id="6" dur="1" fill="hold">
+                                          <p:stCondLst>
+                                            <p:cond delay="0"/>
+                                          </p:stCondLst>
+                                        </p:cTn>
+                                        <p:tgtEl>
+                                          <p:spTgt spid="28"/>
+                                        </p:tgtEl>
+                                        <p:attrNameLst>
+                                          <p:attrName>style.visibility</p:attrName>
+                                        </p:attrNameLst>
+                                      </p:cBhvr>
+                                      <p:to>
+                                        <p:strVal val="visible"/>
+                                      </p:to>
+                                    </p:set>
+                                    <p:animEffect transition="in" filter="fade">
+                                      <p:cBhvr>
+                                        <p:cTn id="7" dur="500"/>
+                                        <p:tgtEl>
+                                          <p:spTgt spid="28"/>
+                                        </p:tgtEl>
+                                      </p:cBhvr>
+                                    </p:animEffect>
+                                  </p:childTnLst>
+                                </p:cTn>
+                              </p:par>
+                            </p:childTnLst>
+                          </p:cTn>
+                        </p:par>
+                      </p:childTnLst>
+                    </p:cTn>
+                  </p:par>
+                  <p:par>
+                    <p:cTn id="8" fill="hold">
+                      <p:stCondLst>
+                        <p:cond delay="indefinite"/>
+                      </p:stCondLst>
+                      <p:childTnLst>
+                        <p:par>
+                          <p:cTn id="9" fill="hold">
+                            <p:stCondLst>
+                              <p:cond delay="0"/>
+                            </p:stCondLst>
+                            <p:childTnLst>
+                              <p:par>
+                                <p:cTn id="10" presetID="10" presetClass="entr" presetSubtype="0" fill="hold" nodeType="clickEffect">
+                                  <p:stCondLst>
+                                    <p:cond delay="0"/>
+                                  </p:stCondLst>
+                                  <p:childTnLst>
+                                    <p:set>
+                                      <p:cBhvr>
+                                        <p:cTn id="11" dur="1" fill="hold">
+                                          <p:stCondLst>
+                                            <p:cond delay="0"/>
+                                          </p:stCondLst>
+                                        </p:cTn>
+                                        <p:tgtEl>
+                                          <p:spTgt spid="21"/>
+                                        </p:tgtEl>
+                                        <p:attrNameLst>
+                                          <p:attrName>style.visibility</p:attrName>
+                                        </p:attrNameLst>
+                                      </p:cBhvr>
+                                      <p:to>
+                                        <p:strVal val="visible"/>
+                                      </p:to>
+                                    </p:set>
+                                    <p:animEffect transition="in" filter="fade">
+                                      <p:cBhvr>
+                                        <p:cTn id="12" dur="500"/>
+                                        <p:tgtEl>
+                                          <p:spTgt spid="21"/>
+                                        </p:tgtEl>
+                                      </p:cBhvr>
+                                    </p:animEffect>
+                                  </p:childTnLst>
+                                </p:cTn>
+                              </p:par>
+                            </p:childTnLst>
+                          </p:cTn>
+                        </p:par>
+                      </p:childTnLst>
+                    </p:cTn>
+                  </p:par>
+                  <p:par>
+                    <p:cTn id="13" fill="hold">
+                      <p:stCondLst>
+                        <p:cond delay="indefinite"/>
+                      </p:stCondLst>
+                      <p:childTnLst>
+                        <p:par>
+                          <p:cTn id="14" fill="hold">
+                            <p:stCondLst>
+                              <p:cond delay="0"/>
+                            </p:stCondLst>
+                            <p:childTnLst>
+                              <p:par>
+                                <p:cTn id="15" presetID="10" presetClass="entr" presetSubtype="0" fill="hold" grpId="0" nodeType="clickEffect">
+                                  <p:stCondLst>
+                                    <p:cond delay="0"/>
+                                  </p:stCondLst>
+                                  <p:childTnLst>
+                                    <p:set>
+                                      <p:cBhvr>
+                                        <p:cTn id="16" dur="1" fill="hold">
+                                          <p:stCondLst>
+                                            <p:cond delay="0"/>
+                                          </p:stCondLst>
+                                        </p:cTn>
+                                        <p:tgtEl>
+                                          <p:spTgt spid="22"/>
+                                        </p:tgtEl>
+                                        <p:attrNameLst>
+                                          <p:attrName>style.visibility</p:attrName>
+                                        </p:attrNameLst>
+                                      </p:cBhvr>
+                                      <p:to>
+                                        <p:strVal val="visible"/>
+                                      </p:to>
+                                    </p:set>
+                                    <p:animEffect transition="in" filter="fade">
+                                      <p:cBhvr>
+                                        <p:cTn id="17" dur="500"/>
+                                        <p:tgtEl>
+                                          <p:spTgt spid="22"/>
+                                        </p:tgtEl>
+                                      </p:cBhvr>
+                                    </p:animEffect>
+                                  </p:childTnLst>
+                                </p:cTn>
+                              </p:par>
+                            </p:childTnLst>
+                          </p:cTn>
+                        </p:par>
+                      </p:childTnLst>
+                    </p:cTn>
+                  </p:par>
+                  <p:par>
+                    <p:cTn id="18" fill="hold">
+                      <p:stCondLst>
+                        <p:cond delay="indefinite"/>
+                      </p:stCondLst>
+                      <p:childTnLst>
+                        <p:par>
+                          <p:cTn id="19" fill="hold">
+                            <p:stCondLst>
+                              <p:cond delay="0"/>
+                            </p:stCondLst>
+                            <p:childTnLst>
+                              <p:par>
+                                <p:cTn id="20" presetID="10" presetClass="entr" presetSubtype="0" fill="hold" grpId="0" nodeType="clickEffect">
+                                  <p:stCondLst>
+                                    <p:cond delay="0"/>
+                                  </p:stCondLst>
+                                  <p:childTnLst>
+                                    <p:set>
+                                      <p:cBhvr>
+                                        <p:cTn id="21" dur="1" fill="hold">
+                                          <p:stCondLst>
+                                            <p:cond delay="0"/>
+                                          </p:stCondLst>
+                                        </p:cTn>
+                                        <p:tgtEl>
+                                          <p:spTgt spid="9"/>
+                                        </p:tgtEl>
+                                        <p:attrNameLst>
+                                          <p:attrName>style.visibility</p:attrName>
+                                        </p:attrNameLst>
+                                      </p:cBhvr>
+                                      <p:to>
+                                        <p:strVal val="visible"/>
+                                      </p:to>
+                                    </p:set>
+                                    <p:animEffect transition="in" filter="fade">
+                                      <p:cBhvr>
+                                        <p:cTn id="22" dur="500"/>
+                                        <p:tgtEl>
+                                          <p:spTgt spid="9"/>
+                                        </p:tgtEl>
+                                      </p:cBhvr>
+                                    </p:animEffect>
+                                  </p:childTnLst>
+                                </p:cTn>
+                              </p:par>
+                              <p:par>
+                                <p:cTn id="23" presetID="10" presetClass="entr" presetSubtype="0" fill="hold" nodeType="withEffect">
+                                  <p:stCondLst>
+                                    <p:cond delay="0"/>
+                                  </p:stCondLst>
+                                  <p:childTnLst>
+                                    <p:set>
+                                      <p:cBhvr>
+                                        <p:cTn id="24" dur="1" fill="hold">
+                                          <p:stCondLst>
+                                            <p:cond delay="0"/>
+                                          </p:stCondLst>
+                                        </p:cTn>
+                                        <p:tgtEl>
+                                          <p:spTgt spid="13"/>
+                                        </p:tgtEl>
+                                        <p:attrNameLst>
+                                          <p:attrName>style.visibility</p:attrName>
+                                        </p:attrNameLst>
+                                      </p:cBhvr>
+                                      <p:to>
+                                        <p:strVal val="visible"/>
+                                      </p:to>
+                                    </p:set>
+                                    <p:animEffect transition="in" filter="fade">
+                                      <p:cBhvr>
+                                        <p:cTn id="25" dur="500"/>
+                                        <p:tgtEl>
+                                          <p:spTgt spid="13"/>
+                                        </p:tgtEl>
+                                      </p:cBhvr>
+                                    </p:animEffect>
+                                  </p:childTnLst>
+                                </p:cTn>
+                              </p:par>
+                              <p:par>
+                                <p:cTn id="26" presetID="10" presetClass="entr" presetSubtype="0" fill="hold" nodeType="withEffect">
+                                  <p:stCondLst>
+                                    <p:cond delay="0"/>
+                                  </p:stCondLst>
+                                  <p:childTnLst>
+                                    <p:set>
+                                      <p:cBhvr>
+                                        <p:cTn id="27" dur="1" fill="hold">
+                                          <p:stCondLst>
+                                            <p:cond delay="0"/>
+                                          </p:stCondLst>
+                                        </p:cTn>
+                                        <p:tgtEl>
+                                          <p:spTgt spid="20"/>
+                                        </p:tgtEl>
+                                        <p:attrNameLst>
+                                          <p:attrName>style.visibility</p:attrName>
+                                        </p:attrNameLst>
+                                      </p:cBhvr>
+                                      <p:to>
+                                        <p:strVal val="visible"/>
+                                      </p:to>
+                                    </p:set>
+                                    <p:animEffect transition="in" filter="fade">
+                                      <p:cBhvr>
+                                        <p:cTn id="28" dur="500"/>
+                                        <p:tgtEl>
+                                          <p:spTgt spid="20"/>
+                                        </p:tgtEl>
+                                      </p:cBhvr>
+                                    </p:animEffect>
+                                  </p:childTnLst>
+                                </p:cTn>
+                              </p:par>
+                            </p:childTnLst>
+                          </p:cTn>
+                        </p:par>
+                      </p:childTnLst>
+                    </p:cTn>
+                  </p:par>
+                  <p:par>
+                    <p:cTn id="29" fill="hold">
+                      <p:stCondLst>
+                        <p:cond delay="indefinite"/>
+                      </p:stCondLst>
+                      <p:childTnLst>
+                        <p:par>
+                          <p:cTn id="30" fill="hold">
+                            <p:stCondLst>
+                              <p:cond delay="0"/>
+                            </p:stCondLst>
+                            <p:childTnLst>
+                              <p:par>
+                                <p:cTn id="31" presetID="10" presetClass="entr" presetSubtype="0" fill="hold" grpId="0" nodeType="clickEffect">
+                                  <p:stCondLst>
+                                    <p:cond delay="0"/>
+                                  </p:stCondLst>
+                                  <p:childTnLst>
+                                    <p:set>
+                                      <p:cBhvr>
+                                        <p:cTn id="32" dur="1" fill="hold">
+                                          <p:stCondLst>
+                                            <p:cond delay="0"/>
+                                          </p:stCondLst>
+                                        </p:cTn>
+                                        <p:tgtEl>
+                                          <p:spTgt spid="7"/>
+                                        </p:tgtEl>
+                                        <p:attrNameLst>
+                                          <p:attrName>style.visibility</p:attrName>
+                                        </p:attrNameLst>
+                                      </p:cBhvr>
+                                      <p:to>
+                                        <p:strVal val="visible"/>
+                                      </p:to>
+                                    </p:set>
+                                    <p:animEffect transition="in" filter="fade">
+                                      <p:cBhvr>
+                                        <p:cTn id="33" dur="500"/>
+                                        <p:tgtEl>
+                                          <p:spTgt spid="7"/>
+                                        </p:tgtEl>
+                                      </p:cBhvr>
+                                    </p:animEffect>
+                                  </p:childTnLst>
+                                </p:cTn>
+                              </p:par>
+                              <p:par>
+                                <p:cTn id="34" presetID="10" presetClass="entr" presetSubtype="0" fill="hold" nodeType="withEffect">
+                                  <p:stCondLst>
+                                    <p:cond delay="0"/>
+                                  </p:stCondLst>
+                                  <p:childTnLst>
+                                    <p:set>
+                                      <p:cBhvr>
+                                        <p:cTn id="35" dur="1" fill="hold">
+                                          <p:stCondLst>
+                                            <p:cond delay="0"/>
+                                          </p:stCondLst>
+                                        </p:cTn>
+                                        <p:tgtEl>
+                                          <p:spTgt spid="24"/>
+                                        </p:tgtEl>
+                                        <p:attrNameLst>
+                                          <p:attrName>style.visibility</p:attrName>
+                                        </p:attrNameLst>
+                                      </p:cBhvr>
+                                      <p:to>
+                                        <p:strVal val="visible"/>
+                                      </p:to>
+                                    </p:set>
+                                    <p:animEffect transition="in" filter="fade">
+                                      <p:cBhvr>
+                                        <p:cTn id="36" dur="500"/>
+                                        <p:tgtEl>
+                                          <p:spTgt spid="24"/>
+                                        </p:tgtEl>
+                                      </p:cBhvr>
+                                    </p:animEffect>
+                                  </p:childTnLst>
+                                </p:cTn>
+                              </p:par>
+                              <p:par>
+                                <p:cTn id="37" presetID="10" presetClass="entr" presetSubtype="0" fill="hold" grpId="0" nodeType="withEffect">
+                                  <p:stCondLst>
+                                    <p:cond delay="0"/>
+                                  </p:stCondLst>
+                                  <p:childTnLst>
+                                    <p:set>
+                                      <p:cBhvr>
+                                        <p:cTn id="38" dur="1" fill="hold">
+                                          <p:stCondLst>
+                                            <p:cond delay="0"/>
+                                          </p:stCondLst>
+                                        </p:cTn>
+                                        <p:tgtEl>
+                                          <p:spTgt spid="4"/>
+                                        </p:tgtEl>
+                                        <p:attrNameLst>
+                                          <p:attrName>style.visibility</p:attrName>
+                                        </p:attrNameLst>
+                                      </p:cBhvr>
+                                      <p:to>
+                                        <p:strVal val="visible"/>
+                                      </p:to>
+                                    </p:set>
+                                    <p:animEffect transition="in" filter="fade">
+                                      <p:cBhvr>
+                                        <p:cTn id="39" dur="500"/>
+                                        <p:tgtEl>
+                                          <p:spTgt spid="4"/>
+                                        </p:tgtEl>
+                                      </p:cBhvr>
+                                    </p:animEffect>
+                                  </p:childTnLst>
+                                </p:cTn>
+                              </p:par>
+                            </p:childTnLst>
+                          </p:cTn>
+                        </p:par>
+                      </p:childTnLst>
+                    </p:cTn>
+                  </p:par>
+                  <p:par>
+                    <p:cTn id="40" fill="hold">
+                      <p:stCondLst>
+                        <p:cond delay="indefinite"/>
+                      </p:stCondLst>
+                      <p:childTnLst>
+                        <p:par>
+                          <p:cTn id="41" fill="hold">
+                            <p:stCondLst>
+                              <p:cond delay="0"/>
+                            </p:stCondLst>
+                            <p:childTnLst>
+                              <p:par>
+                                <p:cTn id="42" presetID="10" presetClass="entr" presetSubtype="0" fill="hold" nodeType="clickEffect">
+                                  <p:stCondLst>
+                                    <p:cond delay="0"/>
+                                  </p:stCondLst>
+                                  <p:childTnLst>
+                                    <p:set>
+                                      <p:cBhvr>
+                                        <p:cTn id="43" dur="1" fill="hold">
+                                          <p:stCondLst>
+                                            <p:cond delay="0"/>
+                                          </p:stCondLst>
+                                        </p:cTn>
+                                        <p:tgtEl>
+                                          <p:spTgt spid="14"/>
+                                        </p:tgtEl>
+                                        <p:attrNameLst>
+                                          <p:attrName>style.visibility</p:attrName>
+                                        </p:attrNameLst>
+                                      </p:cBhvr>
+                                      <p:to>
+                                        <p:strVal val="visible"/>
+                                      </p:to>
+                                    </p:set>
+                                    <p:animEffect transition="in" filter="fade">
+                                      <p:cBhvr>
+                                        <p:cTn id="44" dur="500"/>
+                                        <p:tgtEl>
+                                          <p:spTgt spid="14"/>
+                                        </p:tgtEl>
+                                      </p:cBhvr>
+                                    </p:animEffect>
+                                  </p:childTnLst>
+                                </p:cTn>
+                              </p:par>
+                              <p:par>
+                                <p:cTn id="45" presetID="10" presetClass="entr" presetSubtype="0" fill="hold" grpId="0" nodeType="withEffect">
+                                  <p:stCondLst>
+                                    <p:cond delay="0"/>
+                                  </p:stCondLst>
+                                  <p:childTnLst>
+                                    <p:set>
+                                      <p:cBhvr>
+                                        <p:cTn id="46" dur="1" fill="hold">
+                                          <p:stCondLst>
+                                            <p:cond delay="0"/>
+                                          </p:stCondLst>
+                                        </p:cTn>
+                                        <p:tgtEl>
+                                          <p:spTgt spid="11"/>
+                                        </p:tgtEl>
+                                        <p:attrNameLst>
+                                          <p:attrName>style.visibility</p:attrName>
+                                        </p:attrNameLst>
+                                      </p:cBhvr>
+                                      <p:to>
+                                        <p:strVal val="visible"/>
+                                      </p:to>
+                                    </p:set>
+                                    <p:animEffect transition="in" filter="fade">
+                                      <p:cBhvr>
+                                        <p:cTn id="47" dur="500"/>
+                                        <p:tgtEl>
+                                          <p:spTgt spid="11"/>
+                                        </p:tgtEl>
+                                      </p:cBhvr>
+                                    </p:animEffect>
+                                  </p:childTnLst>
+                                </p:cTn>
+                              </p:par>
+                            </p:childTnLst>
+                          </p:cTn>
+                        </p:par>
+                      </p:childTnLst>
+                    </p:cTn>
+                  </p:par>
+                </p:childTnLst>
+              </p:cTn>
+              <p:prevCondLst>
+                <p:cond evt="onPrev" delay="0">
+                  <p:tgtEl>
+                    <p:sldTgt/>
+                  </p:tgtEl>
+                </p:cond>
+              </p:prevCondLst>
+              <p:nextCondLst>
+                <p:cond evt="onNext" delay="0">
+                  <p:tgtEl>
+                    <p:sldTgt/>
+                  </p:tgtEl>
+                </p:cond>
+              </p:nextCondLst>
+            </p:seq>
+          </p:childTnLst>
+        </p:cTn>
+      </p:par>
+    </p:tnLst>
+    <p:bldLst>
+      <p:bldP spid="7" grpId="0" animBg="1"/>
+      <p:bldP spid="9" grpId="0" animBg="1"/>
+      <p:bldP spid="11" grpId="0" animBg="1"/>
+      <p:bldP spid="22" grpId="0" animBg="1"/>
+      <p:bldP spid="4" grpId="0" animBg="1"/>
+    </p:bldLst>
+  </p:timing>
+</p:sld>
+</file>
+
+<file path=ppt/slides/slide27.xml><?xml version="1.0" encoding="utf-8"?>
+<p:sld xmlns:a="http://schemas.openxmlformats.org/drawingml/2006/main" xmlns:r="http://schemas.openxmlformats.org/officeDocument/2006/relationships" xmlns:p="http://schemas.openxmlformats.org/presentationml/2006/main">
+  <p:cSld>
+    <p:spTree>
+      <p:nvGrpSpPr>
+        <p:cNvPr id="1" name=""/>
+        <p:cNvGrpSpPr/>
+        <p:nvPr/>
+      </p:nvGrpSpPr>
+      <p:grpSpPr>
+        <a:xfrm>
+          <a:off x="0" y="0"/>
+          <a:ext cx="0" cy="0"/>
+          <a:chOff x="0" y="0"/>
+          <a:chExt cx="0" cy="0"/>
+        </a:xfrm>
+      </p:grpSpPr>
+      <p:sp>
+        <p:nvSpPr>
+          <p:cNvPr id="2" name="Titre 1"/>
+          <p:cNvSpPr>
+            <a:spLocks noGrp="1"/>
+          </p:cNvSpPr>
+          <p:nvPr>
+            <p:ph type="title"/>
+          </p:nvPr>
+        </p:nvSpPr>
+        <p:spPr/>
+        <p:txBody>
+          <a:bodyPr/>
+          <a:lstStyle/>
+          <a:p>
+            <a:endParaRPr lang="fr-FR"/>
+          </a:p>
+        </p:txBody>
+      </p:sp>
+      <p:sp>
+        <p:nvSpPr>
+          <p:cNvPr id="3" name="Espace réservé du contenu 2"/>
+          <p:cNvSpPr>
+            <a:spLocks noGrp="1"/>
+          </p:cNvSpPr>
+          <p:nvPr>
+            <p:ph sz="half" idx="1"/>
+          </p:nvPr>
+        </p:nvSpPr>
+        <p:spPr/>
+        <p:txBody>
+          <a:bodyPr/>
+          <a:lstStyle/>
+          <a:p>
+            <a:endParaRPr lang="fr-FR"/>
+          </a:p>
+        </p:txBody>
+      </p:sp>
+      <p:sp>
+        <p:nvSpPr>
+          <p:cNvPr id="4" name="Espace réservé du contenu 3"/>
+          <p:cNvSpPr>
+            <a:spLocks noGrp="1"/>
+          </p:cNvSpPr>
+          <p:nvPr>
+            <p:ph sz="half" idx="2"/>
+          </p:nvPr>
+        </p:nvSpPr>
+        <p:spPr/>
+        <p:txBody>
+          <a:bodyPr/>
+          <a:lstStyle/>
+          <a:p>
+            <a:endParaRPr lang="fr-FR"/>
+          </a:p>
+        </p:txBody>
+      </p:sp>
+    </p:spTree>
+    <p:extLst>
+      <p:ext uri="{BB962C8B-B14F-4D97-AF65-F5344CB8AC3E}">
+        <p14:creationId xmlns:p14="http://schemas.microsoft.com/office/powerpoint/2010/main" val="423820125"/>
+      </p:ext>
+    </p:extLst>
+  </p:cSld>
+  <p:clrMapOvr>
+    <a:masterClrMapping/>
+  </p:clrMapOvr>
+  <p:timing>
+    <p:tnLst>
+      <p:par>
+        <p:cTn id="1" dur="indefinite" restart="never" nodeType="tmRoot"/>
+      </p:par>
+    </p:tnLst>
   </p:timing>
 </p:sld>
 </file>
@@ -14816,13 +17565,7 @@
               <a:rPr lang="fr-FR" sz="6000" dirty="0" smtClean="0">
                 <a:latin typeface="Calibri" panose="020F0502020204030204" pitchFamily="34" charset="0"/>
               </a:rPr>
-              <a:t>Quelle différence entre classe et instance </a:t>
-            </a:r>
-            <a:r>
-              <a:rPr lang="fr-FR" sz="6000" dirty="0" smtClean="0">
-                <a:latin typeface="Calibri" panose="020F0502020204030204" pitchFamily="34" charset="0"/>
-              </a:rPr>
-              <a:t>?</a:t>
+              <a:t>Quelle différence entre classe et instance ?</a:t>
             </a:r>
           </a:p>
           <a:p>
@@ -18965,7 +21708,7 @@
         <a:noFill/>
         <a:ln w="38100" cap="flat" cmpd="sng" algn="ctr">
           <a:solidFill>
-            <a:schemeClr val="tx1"/>
+            <a:srgbClr val="00B050"/>
           </a:solidFill>
           <a:prstDash val="solid"/>
           <a:round/>
@@ -18986,7 +21729,7 @@
         <a:noFill/>
         <a:ln w="38100" cap="flat" cmpd="sng" algn="ctr">
           <a:solidFill>
-            <a:schemeClr val="tx1"/>
+            <a:srgbClr val="00B050"/>
           </a:solidFill>
           <a:prstDash val="solid"/>
           <a:round/>
@@ -18998,6 +21741,27 @@
       <a:bodyPr/>
       <a:lstStyle/>
     </a:lnDef>
+    <a:txDef>
+      <a:spPr>
+        <a:noFill/>
+        <a:ln w="50800">
+          <a:solidFill>
+            <a:schemeClr val="tx1"/>
+          </a:solidFill>
+        </a:ln>
+      </a:spPr>
+      <a:bodyPr wrap="square" rtlCol="0">
+        <a:spAutoFit/>
+      </a:bodyPr>
+      <a:lstStyle>
+        <a:defPPr>
+          <a:defRPr sz="4400" dirty="0" smtClean="0">
+            <a:latin typeface="Calibri" panose="020F0502020204030204" pitchFamily="34" charset="0"/>
+            <a:cs typeface="Calibri" panose="020F0502020204030204" pitchFamily="34" charset="0"/>
+          </a:defRPr>
+        </a:defPPr>
+      </a:lstStyle>
+    </a:txDef>
   </a:objectDefaults>
   <a:extraClrSchemeLst>
     <a:extraClrScheme>

</xml_diff>